<commit_message>
MODFIED Préentation, ajour de la partie messagerie
</commit_message>
<xml_diff>
--- a/Projet 2A - Powerpoint Youtube.pptx
+++ b/Projet 2A - Powerpoint Youtube.pptx
@@ -13,9 +13,16 @@
     <p:sldId id="261" r:id="rId7"/>
     <p:sldId id="267" r:id="rId8"/>
     <p:sldId id="268" r:id="rId9"/>
-    <p:sldId id="266" r:id="rId10"/>
+    <p:sldId id="277" r:id="rId10"/>
     <p:sldId id="269" r:id="rId11"/>
     <p:sldId id="270" r:id="rId12"/>
+    <p:sldId id="271" r:id="rId13"/>
+    <p:sldId id="273" r:id="rId14"/>
+    <p:sldId id="274" r:id="rId15"/>
+    <p:sldId id="272" r:id="rId16"/>
+    <p:sldId id="278" r:id="rId17"/>
+    <p:sldId id="275" r:id="rId18"/>
+    <p:sldId id="276" r:id="rId19"/>
   </p:sldIdLst>
   <p:sldSz cx="12192000" cy="6858000"/>
   <p:notesSz cx="6858000" cy="9144000"/>
@@ -114,6 +121,11 @@
       </a:defRPr>
     </a:lvl9pPr>
   </p:defaultTextStyle>
+  <p:extLst>
+    <p:ext uri="{EFAFB233-063F-42B5-8137-9DF3F51BA10A}">
+      <p15:sldGuideLst xmlns:p15="http://schemas.microsoft.com/office/powerpoint/2012/main"/>
+    </p:ext>
+  </p:extLst>
 </p:presentation>
 </file>
 
@@ -264,7 +276,7 @@
           <a:p>
             <a:fld id="{5E4ADC82-3B55-154E-AAD6-CC4E17E1DBEF}" type="datetimeFigureOut">
               <a:rPr lang="fr-FR" smtClean="0"/>
-              <a:t>07/06/2019</a:t>
+              <a:t>10/06/2019</a:t>
             </a:fld>
             <a:endParaRPr lang="fr-FR"/>
           </a:p>
@@ -462,7 +474,7 @@
           <a:p>
             <a:fld id="{5E4ADC82-3B55-154E-AAD6-CC4E17E1DBEF}" type="datetimeFigureOut">
               <a:rPr lang="fr-FR" smtClean="0"/>
-              <a:t>07/06/2019</a:t>
+              <a:t>10/06/2019</a:t>
             </a:fld>
             <a:endParaRPr lang="fr-FR"/>
           </a:p>
@@ -670,7 +682,7 @@
           <a:p>
             <a:fld id="{5E4ADC82-3B55-154E-AAD6-CC4E17E1DBEF}" type="datetimeFigureOut">
               <a:rPr lang="fr-FR" smtClean="0"/>
-              <a:t>07/06/2019</a:t>
+              <a:t>10/06/2019</a:t>
             </a:fld>
             <a:endParaRPr lang="fr-FR"/>
           </a:p>
@@ -868,7 +880,7 @@
           <a:p>
             <a:fld id="{5E4ADC82-3B55-154E-AAD6-CC4E17E1DBEF}" type="datetimeFigureOut">
               <a:rPr lang="fr-FR" smtClean="0"/>
-              <a:t>07/06/2019</a:t>
+              <a:t>10/06/2019</a:t>
             </a:fld>
             <a:endParaRPr lang="fr-FR"/>
           </a:p>
@@ -1143,7 +1155,7 @@
           <a:p>
             <a:fld id="{5E4ADC82-3B55-154E-AAD6-CC4E17E1DBEF}" type="datetimeFigureOut">
               <a:rPr lang="fr-FR" smtClean="0"/>
-              <a:t>07/06/2019</a:t>
+              <a:t>10/06/2019</a:t>
             </a:fld>
             <a:endParaRPr lang="fr-FR"/>
           </a:p>
@@ -1408,7 +1420,7 @@
           <a:p>
             <a:fld id="{5E4ADC82-3B55-154E-AAD6-CC4E17E1DBEF}" type="datetimeFigureOut">
               <a:rPr lang="fr-FR" smtClean="0"/>
-              <a:t>07/06/2019</a:t>
+              <a:t>10/06/2019</a:t>
             </a:fld>
             <a:endParaRPr lang="fr-FR"/>
           </a:p>
@@ -1820,7 +1832,7 @@
           <a:p>
             <a:fld id="{5E4ADC82-3B55-154E-AAD6-CC4E17E1DBEF}" type="datetimeFigureOut">
               <a:rPr lang="fr-FR" smtClean="0"/>
-              <a:t>07/06/2019</a:t>
+              <a:t>10/06/2019</a:t>
             </a:fld>
             <a:endParaRPr lang="fr-FR"/>
           </a:p>
@@ -1961,7 +1973,7 @@
           <a:p>
             <a:fld id="{5E4ADC82-3B55-154E-AAD6-CC4E17E1DBEF}" type="datetimeFigureOut">
               <a:rPr lang="fr-FR" smtClean="0"/>
-              <a:t>07/06/2019</a:t>
+              <a:t>10/06/2019</a:t>
             </a:fld>
             <a:endParaRPr lang="fr-FR"/>
           </a:p>
@@ -2074,7 +2086,7 @@
           <a:p>
             <a:fld id="{5E4ADC82-3B55-154E-AAD6-CC4E17E1DBEF}" type="datetimeFigureOut">
               <a:rPr lang="fr-FR" smtClean="0"/>
-              <a:t>07/06/2019</a:t>
+              <a:t>10/06/2019</a:t>
             </a:fld>
             <a:endParaRPr lang="fr-FR"/>
           </a:p>
@@ -2385,7 +2397,7 @@
           <a:p>
             <a:fld id="{5E4ADC82-3B55-154E-AAD6-CC4E17E1DBEF}" type="datetimeFigureOut">
               <a:rPr lang="fr-FR" smtClean="0"/>
-              <a:t>07/06/2019</a:t>
+              <a:t>10/06/2019</a:t>
             </a:fld>
             <a:endParaRPr lang="fr-FR"/>
           </a:p>
@@ -2673,7 +2685,7 @@
           <a:p>
             <a:fld id="{5E4ADC82-3B55-154E-AAD6-CC4E17E1DBEF}" type="datetimeFigureOut">
               <a:rPr lang="fr-FR" smtClean="0"/>
-              <a:t>07/06/2019</a:t>
+              <a:t>10/06/2019</a:t>
             </a:fld>
             <a:endParaRPr lang="fr-FR"/>
           </a:p>
@@ -2914,7 +2926,7 @@
           <a:p>
             <a:fld id="{5E4ADC82-3B55-154E-AAD6-CC4E17E1DBEF}" type="datetimeFigureOut">
               <a:rPr lang="fr-FR" smtClean="0"/>
-              <a:t>07/06/2019</a:t>
+              <a:t>10/06/2019</a:t>
             </a:fld>
             <a:endParaRPr lang="fr-FR"/>
           </a:p>
@@ -3434,7 +3446,7 @@
             <a:avLst/>
           </a:prstGeom>
           <a:solidFill>
-            <a:srgbClr val="4C4B7A"/>
+            <a:srgbClr val="5D5E3B"/>
           </a:solidFill>
           <a:ln>
             <a:noFill/>
@@ -3595,7 +3607,7 @@
       </p:grpSpPr>
       <p:sp>
         <p:nvSpPr>
-          <p:cNvPr id="12" name="Rectangle 11">
+          <p:cNvPr id="18" name="Rectangle 17">
             <a:extLst>
               <a:ext uri="{FF2B5EF4-FFF2-40B4-BE49-F238E27FC236}">
                 <a16:creationId xmlns:a16="http://schemas.microsoft.com/office/drawing/2014/main" id="{823AC064-BC96-4F32-8AE1-B2FD38754823}"/>
@@ -3618,7 +3630,7 @@
         </p:nvSpPr>
         <p:spPr bwMode="ltGray">
           <a:xfrm>
-            <a:off x="378068" y="343486"/>
+            <a:off x="396882" y="280374"/>
             <a:ext cx="11438793" cy="1844256"/>
           </a:xfrm>
           <a:prstGeom prst="rect">
@@ -3653,37 +3665,8 @@
           <a:bodyPr rtlCol="0" anchor="ctr"/>
           <a:lstStyle/>
           <a:p>
-            <a:pPr marL="0" marR="0" lvl="0" indent="0" algn="ctr" defTabSz="914400" rtl="0" eaLnBrk="1" fontAlgn="auto" latinLnBrk="0" hangingPunct="1">
-              <a:lnSpc>
-                <a:spcPct val="100000"/>
-              </a:lnSpc>
-              <a:spcBef>
-                <a:spcPts val="0"/>
-              </a:spcBef>
-              <a:spcAft>
-                <a:spcPts val="0"/>
-              </a:spcAft>
-              <a:buClrTx/>
-              <a:buSzTx/>
-              <a:buFontTx/>
-              <a:buNone/>
-              <a:tabLst/>
-              <a:defRPr/>
-            </a:pPr>
-            <a:endParaRPr kumimoji="0" lang="en-US" sz="1800" b="0" i="0" u="none" strike="noStrike" kern="1200" cap="none" spc="0" normalizeH="0" baseline="0" noProof="0">
-              <a:ln>
-                <a:noFill/>
-              </a:ln>
-              <a:solidFill>
-                <a:prstClr val="white"/>
-              </a:solidFill>
-              <a:effectLst/>
-              <a:uLnTx/>
-              <a:uFillTx/>
-              <a:latin typeface="Calibri" panose="020F0502020204030204"/>
-              <a:ea typeface="+mn-ea"/>
-              <a:cs typeface="+mn-cs"/>
-            </a:endParaRPr>
+            <a:pPr algn="ctr"/>
+            <a:endParaRPr lang="en-US"/>
           </a:p>
         </p:txBody>
       </p:sp>
@@ -3705,7 +3688,7 @@
         </p:nvSpPr>
         <p:spPr>
           <a:xfrm>
-            <a:off x="526073" y="466578"/>
+            <a:off x="546351" y="433545"/>
             <a:ext cx="11139854" cy="930447"/>
           </a:xfrm>
         </p:spPr>
@@ -3717,27 +3700,19 @@
           <a:p>
             <a:pPr algn="ctr"/>
             <a:r>
-              <a:rPr lang="en-US" sz="4600" dirty="0">
+              <a:rPr lang="en-US" sz="5400">
                 <a:solidFill>
                   <a:srgbClr val="FFFFFF"/>
                 </a:solidFill>
               </a:rPr>
               <a:t>Refactoring: code Java</a:t>
             </a:r>
-            <a:endParaRPr lang="en-US" sz="4600" kern="1200" dirty="0">
-              <a:solidFill>
-                <a:srgbClr val="FFFFFF"/>
-              </a:solidFill>
-              <a:latin typeface="+mj-lt"/>
-              <a:ea typeface="+mj-ea"/>
-              <a:cs typeface="+mj-cs"/>
-            </a:endParaRPr>
           </a:p>
         </p:txBody>
       </p:sp>
       <p:cxnSp>
         <p:nvCxnSpPr>
-          <p:cNvPr id="14" name="Straight Connector 13">
+          <p:cNvPr id="20" name="Straight Connector 19">
             <a:extLst>
               <a:ext uri="{FF2B5EF4-FFF2-40B4-BE49-F238E27FC236}">
                 <a16:creationId xmlns:a16="http://schemas.microsoft.com/office/drawing/2014/main" id="{7E7C77BC-7138-40B1-A15B-20F57A494629}"/>
@@ -3760,7 +3735,7 @@
         </p:nvCxnSpPr>
         <p:spPr>
           <a:xfrm>
-            <a:off x="2209800" y="1448631"/>
+            <a:off x="2230078" y="1522292"/>
             <a:ext cx="7772400" cy="0"/>
           </a:xfrm>
           <a:prstGeom prst="line">
@@ -3789,10 +3764,10 @@
       </p:cxnSp>
       <p:pic>
         <p:nvPicPr>
-          <p:cNvPr id="11" name="Espace réservé du contenu 4" descr="Une image contenant capture d’écran&#10;&#10;Description générée automatiquement">
-            <a:extLst>
-              <a:ext uri="{FF2B5EF4-FFF2-40B4-BE49-F238E27FC236}">
-                <a16:creationId xmlns:a16="http://schemas.microsoft.com/office/drawing/2014/main" id="{F87FE6CE-4154-3441-828F-C8FCB401B37B}"/>
+          <p:cNvPr id="13" name="Image 12" descr="Une image contenant capture d’écran, assis&#10;&#10;Description générée automatiquement">
+            <a:extLst>
+              <a:ext uri="{FF2B5EF4-FFF2-40B4-BE49-F238E27FC236}">
+                <a16:creationId xmlns:a16="http://schemas.microsoft.com/office/drawing/2014/main" id="{5BF44379-D3CC-B64A-9404-A264CE2A357D}"/>
               </a:ext>
             </a:extLst>
           </p:cNvPr>
@@ -3809,20 +3784,72 @@
         </p:blipFill>
         <p:spPr>
           <a:xfrm>
-            <a:off x="6938271" y="2494017"/>
-            <a:ext cx="4415529" cy="3903659"/>
+            <a:off x="813662" y="2426818"/>
+            <a:ext cx="4491727" cy="3997637"/>
           </a:xfrm>
           <a:prstGeom prst="rect">
             <a:avLst/>
           </a:prstGeom>
         </p:spPr>
       </p:pic>
+      <p:cxnSp>
+        <p:nvCxnSpPr>
+          <p:cNvPr id="22" name="Straight Connector 21">
+            <a:extLst>
+              <a:ext uri="{FF2B5EF4-FFF2-40B4-BE49-F238E27FC236}">
+                <a16:creationId xmlns:a16="http://schemas.microsoft.com/office/drawing/2014/main" id="{DB146403-F3D6-484B-B2ED-97F9565D0370}"/>
+              </a:ext>
+              <a:ext uri="{C183D7F6-B498-43B3-948B-1728B52AA6E4}">
+                <adec:decorative xmlns:adec="http://schemas.microsoft.com/office/drawing/2017/decorative" val="1"/>
+              </a:ext>
+            </a:extLst>
+          </p:cNvPr>
+          <p:cNvCxnSpPr>
+            <a:cxnSpLocks noGrp="1" noRot="1" noChangeAspect="1" noMove="1" noResize="1" noEditPoints="1" noAdjustHandles="1" noChangeArrowheads="1" noChangeShapeType="1"/>
+          </p:cNvCxnSpPr>
+          <p:nvPr>
+            <p:extLst>
+              <p:ext uri="{386F3935-93C4-4BCD-93E2-E3B085C9AB24}">
+                <p16:designElem xmlns:p16="http://schemas.microsoft.com/office/powerpoint/2015/main" val="1"/>
+              </p:ext>
+            </p:extLst>
+          </p:nvPr>
+        </p:nvCxnSpPr>
+        <p:spPr>
+          <a:xfrm>
+            <a:off x="6116278" y="2596836"/>
+            <a:ext cx="0" cy="3657600"/>
+          </a:xfrm>
+          <a:prstGeom prst="line">
+            <a:avLst/>
+          </a:prstGeom>
+          <a:ln w="101600" cmpd="dbl">
+            <a:solidFill>
+              <a:srgbClr val="595959"/>
+            </a:solidFill>
+          </a:ln>
+        </p:spPr>
+        <p:style>
+          <a:lnRef idx="1">
+            <a:schemeClr val="accent1"/>
+          </a:lnRef>
+          <a:fillRef idx="0">
+            <a:schemeClr val="accent1"/>
+          </a:fillRef>
+          <a:effectRef idx="0">
+            <a:schemeClr val="accent1"/>
+          </a:effectRef>
+          <a:fontRef idx="minor">
+            <a:schemeClr val="tx1"/>
+          </a:fontRef>
+        </p:style>
+      </p:cxnSp>
       <p:pic>
         <p:nvPicPr>
-          <p:cNvPr id="13" name="Image 12" descr="Une image contenant capture d’écran, assis&#10;&#10;Description générée automatiquement">
-            <a:extLst>
-              <a:ext uri="{FF2B5EF4-FFF2-40B4-BE49-F238E27FC236}">
-                <a16:creationId xmlns:a16="http://schemas.microsoft.com/office/drawing/2014/main" id="{5BF44379-D3CC-B64A-9404-A264CE2A357D}"/>
+          <p:cNvPr id="11" name="Espace réservé du contenu 4" descr="Une image contenant capture d’écran&#10;&#10;Description générée automatiquement">
+            <a:extLst>
+              <a:ext uri="{FF2B5EF4-FFF2-40B4-BE49-F238E27FC236}">
+                <a16:creationId xmlns:a16="http://schemas.microsoft.com/office/drawing/2014/main" id="{F87FE6CE-4154-3441-828F-C8FCB401B37B}"/>
               </a:ext>
             </a:extLst>
           </p:cNvPr>
@@ -3839,8 +3866,8 @@
         </p:blipFill>
         <p:spPr>
           <a:xfrm>
-            <a:off x="955416" y="2494019"/>
-            <a:ext cx="4389089" cy="3903661"/>
+            <a:off x="6914480" y="2426818"/>
+            <a:ext cx="4517103" cy="3997637"/>
           </a:xfrm>
           <a:prstGeom prst="rect">
             <a:avLst/>
@@ -4049,7 +4076,7 @@
           <a:p>
             <a:pPr algn="ctr"/>
             <a:r>
-              <a:rPr lang="en-US" sz="5800" kern="1200" dirty="0" err="1">
+              <a:rPr lang="en-US" sz="5800" kern="1200">
                 <a:solidFill>
                   <a:schemeClr val="tx1"/>
                 </a:solidFill>
@@ -4203,7 +4230,7 @@
 </p:sld>
 </file>
 
-<file path=ppt/slides/slide2.xml><?xml version="1.0" encoding="utf-8"?>
+<file path=ppt/slides/slide12.xml><?xml version="1.0" encoding="utf-8"?>
 <p:sld xmlns:a="http://schemas.openxmlformats.org/drawingml/2006/main" xmlns:r="http://schemas.openxmlformats.org/officeDocument/2006/relationships" xmlns:p="http://schemas.openxmlformats.org/presentationml/2006/main">
   <p:cSld>
     <p:bg>
@@ -4214,6 +4241,2562 @@
         <a:effectLst/>
       </p:bgPr>
     </p:bg>
+    <p:spTree>
+      <p:nvGrpSpPr>
+        <p:cNvPr id="1" name=""/>
+        <p:cNvGrpSpPr/>
+        <p:nvPr/>
+      </p:nvGrpSpPr>
+      <p:grpSpPr>
+        <a:xfrm>
+          <a:off x="0" y="0"/>
+          <a:ext cx="0" cy="0"/>
+          <a:chOff x="0" y="0"/>
+          <a:chExt cx="0" cy="0"/>
+        </a:xfrm>
+      </p:grpSpPr>
+      <p:sp>
+        <p:nvSpPr>
+          <p:cNvPr id="77" name="Rectangle 76">
+            <a:extLst>
+              <a:ext uri="{FF2B5EF4-FFF2-40B4-BE49-F238E27FC236}">
+                <a16:creationId xmlns:a16="http://schemas.microsoft.com/office/drawing/2014/main" id="{74DEA32D-DC21-471A-97C9-7A43FF59ADD9}"/>
+              </a:ext>
+              <a:ext uri="{C183D7F6-B498-43B3-948B-1728B52AA6E4}">
+                <adec:decorative xmlns:adec="http://schemas.microsoft.com/office/drawing/2017/decorative" val="1"/>
+              </a:ext>
+            </a:extLst>
+          </p:cNvPr>
+          <p:cNvSpPr>
+            <a:spLocks noGrp="1" noRot="1" noChangeAspect="1" noMove="1" noResize="1" noEditPoints="1" noAdjustHandles="1" noChangeArrowheads="1" noChangeShapeType="1" noTextEdit="1"/>
+          </p:cNvSpPr>
+          <p:nvPr>
+            <p:extLst>
+              <p:ext uri="{386F3935-93C4-4BCD-93E2-E3B085C9AB24}">
+                <p16:designElem xmlns:p16="http://schemas.microsoft.com/office/powerpoint/2015/main" val="1"/>
+              </p:ext>
+            </p:extLst>
+          </p:nvPr>
+        </p:nvSpPr>
+        <p:spPr>
+          <a:xfrm>
+            <a:off x="-1" y="1"/>
+            <a:ext cx="12192001" cy="6857999"/>
+          </a:xfrm>
+          <a:prstGeom prst="rect">
+            <a:avLst/>
+          </a:prstGeom>
+          <a:solidFill>
+            <a:schemeClr val="tx1"/>
+          </a:solidFill>
+          <a:ln>
+            <a:noFill/>
+          </a:ln>
+        </p:spPr>
+        <p:style>
+          <a:lnRef idx="2">
+            <a:schemeClr val="accent1">
+              <a:shade val="50000"/>
+            </a:schemeClr>
+          </a:lnRef>
+          <a:fillRef idx="1">
+            <a:schemeClr val="accent1"/>
+          </a:fillRef>
+          <a:effectRef idx="0">
+            <a:schemeClr val="accent1"/>
+          </a:effectRef>
+          <a:fontRef idx="minor">
+            <a:schemeClr val="lt1"/>
+          </a:fontRef>
+        </p:style>
+        <p:txBody>
+          <a:bodyPr rtlCol="0" anchor="ctr"/>
+          <a:lstStyle/>
+          <a:p>
+            <a:pPr algn="ctr"/>
+            <a:endParaRPr lang="en-US"/>
+          </a:p>
+        </p:txBody>
+      </p:sp>
+      <p:pic>
+        <p:nvPicPr>
+          <p:cNvPr id="1026" name="Picture 2" descr="RÃ©sultat de recherche d'images pour &quot;firebase&quot;">
+            <a:extLst>
+              <a:ext uri="{FF2B5EF4-FFF2-40B4-BE49-F238E27FC236}">
+                <a16:creationId xmlns:a16="http://schemas.microsoft.com/office/drawing/2014/main" id="{F9DF347F-87D7-4817-9E61-1D8C37ECB2E0}"/>
+              </a:ext>
+            </a:extLst>
+          </p:cNvPr>
+          <p:cNvPicPr>
+            <a:picLocks noChangeAspect="1" noChangeArrowheads="1"/>
+          </p:cNvPicPr>
+          <p:nvPr/>
+        </p:nvPicPr>
+        <p:blipFill>
+          <a:blip r:embed="rId2">
+            <a:extLst>
+              <a:ext uri="{28A0092B-C50C-407E-A947-70E740481C1C}">
+                <a14:useLocalDpi xmlns:a14="http://schemas.microsoft.com/office/drawing/2010/main" val="0"/>
+              </a:ext>
+            </a:extLst>
+          </a:blip>
+          <a:stretch>
+            <a:fillRect/>
+          </a:stretch>
+        </p:blipFill>
+        <p:spPr bwMode="auto">
+          <a:xfrm>
+            <a:off x="7165869" y="366227"/>
+            <a:ext cx="4872309" cy="1373105"/>
+          </a:xfrm>
+          <a:prstGeom prst="rect">
+            <a:avLst/>
+          </a:prstGeom>
+          <a:noFill/>
+          <a:extLst>
+            <a:ext uri="{909E8E84-426E-40DD-AFC4-6F175D3DCCD1}">
+              <a14:hiddenFill xmlns:a14="http://schemas.microsoft.com/office/drawing/2010/main">
+                <a:solidFill>
+                  <a:srgbClr val="FFFFFF"/>
+                </a:solidFill>
+              </a14:hiddenFill>
+            </a:ext>
+          </a:extLst>
+        </p:spPr>
+      </p:pic>
+      <p:pic>
+        <p:nvPicPr>
+          <p:cNvPr id="1032" name="Picture 8" descr="RÃ©sultat de recherche d'images pour &quot;firebase realtime database&quot;">
+            <a:extLst>
+              <a:ext uri="{FF2B5EF4-FFF2-40B4-BE49-F238E27FC236}">
+                <a16:creationId xmlns:a16="http://schemas.microsoft.com/office/drawing/2014/main" id="{F7F6DC2E-AFF6-4646-ACCC-02721225F53A}"/>
+              </a:ext>
+            </a:extLst>
+          </p:cNvPr>
+          <p:cNvPicPr>
+            <a:picLocks noChangeAspect="1" noChangeArrowheads="1"/>
+          </p:cNvPicPr>
+          <p:nvPr/>
+        </p:nvPicPr>
+        <p:blipFill>
+          <a:blip r:embed="rId3">
+            <a:extLst>
+              <a:ext uri="{28A0092B-C50C-407E-A947-70E740481C1C}">
+                <a14:useLocalDpi xmlns:a14="http://schemas.microsoft.com/office/drawing/2010/main" val="0"/>
+              </a:ext>
+            </a:extLst>
+          </a:blip>
+          <a:stretch>
+            <a:fillRect/>
+          </a:stretch>
+        </p:blipFill>
+        <p:spPr bwMode="auto">
+          <a:xfrm>
+            <a:off x="8918918" y="2426124"/>
+            <a:ext cx="1811442" cy="1811442"/>
+          </a:xfrm>
+          <a:prstGeom prst="rect">
+            <a:avLst/>
+          </a:prstGeom>
+          <a:noFill/>
+          <a:extLst>
+            <a:ext uri="{909E8E84-426E-40DD-AFC4-6F175D3DCCD1}">
+              <a14:hiddenFill xmlns:a14="http://schemas.microsoft.com/office/drawing/2010/main">
+                <a:solidFill>
+                  <a:srgbClr val="FFFFFF"/>
+                </a:solidFill>
+              </a14:hiddenFill>
+            </a:ext>
+          </a:extLst>
+        </p:spPr>
+      </p:pic>
+      <p:pic>
+        <p:nvPicPr>
+          <p:cNvPr id="1030" name="Picture 6" descr="RÃ©sultat de recherche d'images pour &quot;firebase realtime database&quot;">
+            <a:extLst>
+              <a:ext uri="{FF2B5EF4-FFF2-40B4-BE49-F238E27FC236}">
+                <a16:creationId xmlns:a16="http://schemas.microsoft.com/office/drawing/2014/main" id="{AB1B4F93-370A-4CF3-935B-C64891A458FD}"/>
+              </a:ext>
+            </a:extLst>
+          </p:cNvPr>
+          <p:cNvPicPr>
+            <a:picLocks noChangeAspect="1" noChangeArrowheads="1"/>
+          </p:cNvPicPr>
+          <p:nvPr/>
+        </p:nvPicPr>
+        <p:blipFill>
+          <a:blip r:embed="rId4">
+            <a:extLst>
+              <a:ext uri="{28A0092B-C50C-407E-A947-70E740481C1C}">
+                <a14:useLocalDpi xmlns:a14="http://schemas.microsoft.com/office/drawing/2010/main" val="0"/>
+              </a:ext>
+            </a:extLst>
+          </a:blip>
+          <a:stretch>
+            <a:fillRect/>
+          </a:stretch>
+        </p:blipFill>
+        <p:spPr bwMode="auto">
+          <a:xfrm>
+            <a:off x="9328449" y="4559299"/>
+            <a:ext cx="1797050" cy="1797050"/>
+          </a:xfrm>
+          <a:prstGeom prst="rect">
+            <a:avLst/>
+          </a:prstGeom>
+          <a:noFill/>
+          <a:extLst>
+            <a:ext uri="{909E8E84-426E-40DD-AFC4-6F175D3DCCD1}">
+              <a14:hiddenFill xmlns:a14="http://schemas.microsoft.com/office/drawing/2010/main">
+                <a:solidFill>
+                  <a:srgbClr val="FFFFFF"/>
+                </a:solidFill>
+              </a14:hiddenFill>
+            </a:ext>
+          </a:extLst>
+        </p:spPr>
+      </p:pic>
+      <p:sp>
+        <p:nvSpPr>
+          <p:cNvPr id="79" name="Freeform 3">
+            <a:extLst>
+              <a:ext uri="{FF2B5EF4-FFF2-40B4-BE49-F238E27FC236}">
+                <a16:creationId xmlns:a16="http://schemas.microsoft.com/office/drawing/2014/main" id="{7695D806-0BD6-41DF-81C3-D8C135B40B03}"/>
+              </a:ext>
+              <a:ext uri="{C183D7F6-B498-43B3-948B-1728B52AA6E4}">
+                <adec:decorative xmlns:adec="http://schemas.microsoft.com/office/drawing/2017/decorative" val="1"/>
+              </a:ext>
+            </a:extLst>
+          </p:cNvPr>
+          <p:cNvSpPr>
+            <a:spLocks noGrp="1" noRot="1" noChangeAspect="1" noMove="1" noResize="1" noEditPoints="1" noAdjustHandles="1" noChangeArrowheads="1" noChangeShapeType="1" noTextEdit="1"/>
+          </p:cNvSpPr>
+          <p:nvPr>
+            <p:extLst>
+              <p:ext uri="{386F3935-93C4-4BCD-93E2-E3B085C9AB24}">
+                <p16:designElem xmlns:p16="http://schemas.microsoft.com/office/powerpoint/2015/main" val="1"/>
+              </p:ext>
+            </p:extLst>
+          </p:nvPr>
+        </p:nvSpPr>
+        <p:spPr>
+          <a:xfrm>
+            <a:off x="0" y="-478"/>
+            <a:ext cx="9468701" cy="6858478"/>
+          </a:xfrm>
+          <a:custGeom>
+            <a:avLst/>
+            <a:gdLst>
+              <a:gd name="connsiteX0" fmla="*/ 0 w 8078051"/>
+              <a:gd name="connsiteY0" fmla="*/ 0 h 5829300"/>
+              <a:gd name="connsiteX1" fmla="*/ 4453793 w 8078051"/>
+              <a:gd name="connsiteY1" fmla="*/ 0 h 5829300"/>
+              <a:gd name="connsiteX2" fmla="*/ 5363426 w 8078051"/>
+              <a:gd name="connsiteY2" fmla="*/ 0 h 5829300"/>
+              <a:gd name="connsiteX3" fmla="*/ 5368184 w 8078051"/>
+              <a:gd name="connsiteY3" fmla="*/ 0 h 5829300"/>
+              <a:gd name="connsiteX4" fmla="*/ 8078051 w 8078051"/>
+              <a:gd name="connsiteY4" fmla="*/ 5829300 h 5829300"/>
+              <a:gd name="connsiteX5" fmla="*/ 1743926 w 8078051"/>
+              <a:gd name="connsiteY5" fmla="*/ 5829300 h 5829300"/>
+              <a:gd name="connsiteX6" fmla="*/ 1744148 w 8078051"/>
+              <a:gd name="connsiteY6" fmla="*/ 5828822 h 5829300"/>
+              <a:gd name="connsiteX7" fmla="*/ 0 w 8078051"/>
+              <a:gd name="connsiteY7" fmla="*/ 5828822 h 5829300"/>
+            </a:gdLst>
+            <a:ahLst/>
+            <a:cxnLst>
+              <a:cxn ang="0">
+                <a:pos x="connsiteX0" y="connsiteY0"/>
+              </a:cxn>
+              <a:cxn ang="0">
+                <a:pos x="connsiteX1" y="connsiteY1"/>
+              </a:cxn>
+              <a:cxn ang="0">
+                <a:pos x="connsiteX2" y="connsiteY2"/>
+              </a:cxn>
+              <a:cxn ang="0">
+                <a:pos x="connsiteX3" y="connsiteY3"/>
+              </a:cxn>
+              <a:cxn ang="0">
+                <a:pos x="connsiteX4" y="connsiteY4"/>
+              </a:cxn>
+              <a:cxn ang="0">
+                <a:pos x="connsiteX5" y="connsiteY5"/>
+              </a:cxn>
+              <a:cxn ang="0">
+                <a:pos x="connsiteX6" y="connsiteY6"/>
+              </a:cxn>
+              <a:cxn ang="0">
+                <a:pos x="connsiteX7" y="connsiteY7"/>
+              </a:cxn>
+            </a:cxnLst>
+            <a:rect l="l" t="t" r="r" b="b"/>
+            <a:pathLst>
+              <a:path w="8078051" h="5829300">
+                <a:moveTo>
+                  <a:pt x="0" y="0"/>
+                </a:moveTo>
+                <a:lnTo>
+                  <a:pt x="4453793" y="0"/>
+                </a:lnTo>
+                <a:lnTo>
+                  <a:pt x="5363426" y="0"/>
+                </a:lnTo>
+                <a:lnTo>
+                  <a:pt x="5368184" y="0"/>
+                </a:lnTo>
+                <a:lnTo>
+                  <a:pt x="8078051" y="5829300"/>
+                </a:lnTo>
+                <a:lnTo>
+                  <a:pt x="1743926" y="5829300"/>
+                </a:lnTo>
+                <a:lnTo>
+                  <a:pt x="1744148" y="5828822"/>
+                </a:lnTo>
+                <a:lnTo>
+                  <a:pt x="0" y="5828822"/>
+                </a:lnTo>
+                <a:close/>
+              </a:path>
+            </a:pathLst>
+          </a:custGeom>
+          <a:solidFill>
+            <a:schemeClr val="bg1">
+              <a:alpha val="70000"/>
+            </a:schemeClr>
+          </a:solidFill>
+          <a:ln>
+            <a:noFill/>
+          </a:ln>
+        </p:spPr>
+        <p:style>
+          <a:lnRef idx="2">
+            <a:schemeClr val="accent1">
+              <a:shade val="50000"/>
+            </a:schemeClr>
+          </a:lnRef>
+          <a:fillRef idx="1">
+            <a:schemeClr val="accent1"/>
+          </a:fillRef>
+          <a:effectRef idx="0">
+            <a:schemeClr val="accent1"/>
+          </a:effectRef>
+          <a:fontRef idx="minor">
+            <a:schemeClr val="lt1"/>
+          </a:fontRef>
+        </p:style>
+        <p:txBody>
+          <a:bodyPr rtlCol="0" anchor="ctr"/>
+          <a:lstStyle/>
+          <a:p>
+            <a:pPr marL="0" marR="0" lvl="0" indent="0" algn="ctr" defTabSz="914400" eaLnBrk="1" fontAlgn="auto" latinLnBrk="0" hangingPunct="1">
+              <a:lnSpc>
+                <a:spcPct val="100000"/>
+              </a:lnSpc>
+              <a:spcBef>
+                <a:spcPts val="0"/>
+              </a:spcBef>
+              <a:spcAft>
+                <a:spcPts val="0"/>
+              </a:spcAft>
+              <a:buClrTx/>
+              <a:buSzTx/>
+              <a:buFontTx/>
+              <a:buNone/>
+              <a:tabLst/>
+              <a:defRPr/>
+            </a:pPr>
+            <a:endParaRPr kumimoji="0" lang="en-US" sz="1800" b="0" i="0" u="none" strike="noStrike" kern="0" cap="none" spc="0" normalizeH="0" baseline="0" noProof="0">
+              <a:ln>
+                <a:noFill/>
+              </a:ln>
+              <a:solidFill>
+                <a:sysClr val="windowText" lastClr="000000"/>
+              </a:solidFill>
+              <a:effectLst/>
+              <a:uLnTx/>
+              <a:uFillTx/>
+            </a:endParaRPr>
+          </a:p>
+        </p:txBody>
+      </p:sp>
+      <p:sp>
+        <p:nvSpPr>
+          <p:cNvPr id="81" name="Freeform 4">
+            <a:extLst>
+              <a:ext uri="{FF2B5EF4-FFF2-40B4-BE49-F238E27FC236}">
+                <a16:creationId xmlns:a16="http://schemas.microsoft.com/office/drawing/2014/main" id="{5351B1B0-ABAE-4DCC-9C3E-ACDF4485F8E7}"/>
+              </a:ext>
+              <a:ext uri="{C183D7F6-B498-43B3-948B-1728B52AA6E4}">
+                <adec:decorative xmlns:adec="http://schemas.microsoft.com/office/drawing/2017/decorative" val="1"/>
+              </a:ext>
+            </a:extLst>
+          </p:cNvPr>
+          <p:cNvSpPr>
+            <a:spLocks noGrp="1" noRot="1" noChangeAspect="1" noMove="1" noResize="1" noEditPoints="1" noAdjustHandles="1" noChangeArrowheads="1" noChangeShapeType="1" noTextEdit="1"/>
+          </p:cNvSpPr>
+          <p:nvPr>
+            <p:extLst>
+              <p:ext uri="{386F3935-93C4-4BCD-93E2-E3B085C9AB24}">
+                <p16:designElem xmlns:p16="http://schemas.microsoft.com/office/powerpoint/2015/main" val="1"/>
+              </p:ext>
+            </p:extLst>
+          </p:nvPr>
+        </p:nvSpPr>
+        <p:spPr>
+          <a:xfrm>
+            <a:off x="0" y="-478"/>
+            <a:ext cx="8078052" cy="6858478"/>
+          </a:xfrm>
+          <a:custGeom>
+            <a:avLst/>
+            <a:gdLst>
+              <a:gd name="connsiteX0" fmla="*/ 0 w 8078052"/>
+              <a:gd name="connsiteY0" fmla="*/ 0 h 6858478"/>
+              <a:gd name="connsiteX1" fmla="*/ 3829872 w 8078052"/>
+              <a:gd name="connsiteY1" fmla="*/ 0 h 6858478"/>
+              <a:gd name="connsiteX2" fmla="*/ 4896100 w 8078052"/>
+              <a:gd name="connsiteY2" fmla="*/ 0 h 6858478"/>
+              <a:gd name="connsiteX3" fmla="*/ 4901677 w 8078052"/>
+              <a:gd name="connsiteY3" fmla="*/ 0 h 6858478"/>
+              <a:gd name="connsiteX4" fmla="*/ 8078052 w 8078052"/>
+              <a:gd name="connsiteY4" fmla="*/ 6858478 h 6858478"/>
+              <a:gd name="connsiteX5" fmla="*/ 653497 w 8078052"/>
+              <a:gd name="connsiteY5" fmla="*/ 6858478 h 6858478"/>
+              <a:gd name="connsiteX6" fmla="*/ 653757 w 8078052"/>
+              <a:gd name="connsiteY6" fmla="*/ 6857916 h 6858478"/>
+              <a:gd name="connsiteX7" fmla="*/ 0 w 8078052"/>
+              <a:gd name="connsiteY7" fmla="*/ 6857916 h 6858478"/>
+            </a:gdLst>
+            <a:ahLst/>
+            <a:cxnLst>
+              <a:cxn ang="0">
+                <a:pos x="connsiteX0" y="connsiteY0"/>
+              </a:cxn>
+              <a:cxn ang="0">
+                <a:pos x="connsiteX1" y="connsiteY1"/>
+              </a:cxn>
+              <a:cxn ang="0">
+                <a:pos x="connsiteX2" y="connsiteY2"/>
+              </a:cxn>
+              <a:cxn ang="0">
+                <a:pos x="connsiteX3" y="connsiteY3"/>
+              </a:cxn>
+              <a:cxn ang="0">
+                <a:pos x="connsiteX4" y="connsiteY4"/>
+              </a:cxn>
+              <a:cxn ang="0">
+                <a:pos x="connsiteX5" y="connsiteY5"/>
+              </a:cxn>
+              <a:cxn ang="0">
+                <a:pos x="connsiteX6" y="connsiteY6"/>
+              </a:cxn>
+              <a:cxn ang="0">
+                <a:pos x="connsiteX7" y="connsiteY7"/>
+              </a:cxn>
+            </a:cxnLst>
+            <a:rect l="l" t="t" r="r" b="b"/>
+            <a:pathLst>
+              <a:path w="8078052" h="6858478">
+                <a:moveTo>
+                  <a:pt x="0" y="0"/>
+                </a:moveTo>
+                <a:lnTo>
+                  <a:pt x="3829872" y="0"/>
+                </a:lnTo>
+                <a:lnTo>
+                  <a:pt x="4896100" y="0"/>
+                </a:lnTo>
+                <a:lnTo>
+                  <a:pt x="4901677" y="0"/>
+                </a:lnTo>
+                <a:lnTo>
+                  <a:pt x="8078052" y="6858478"/>
+                </a:lnTo>
+                <a:lnTo>
+                  <a:pt x="653497" y="6858478"/>
+                </a:lnTo>
+                <a:lnTo>
+                  <a:pt x="653757" y="6857916"/>
+                </a:lnTo>
+                <a:lnTo>
+                  <a:pt x="0" y="6857916"/>
+                </a:lnTo>
+                <a:close/>
+              </a:path>
+            </a:pathLst>
+          </a:custGeom>
+          <a:solidFill>
+            <a:schemeClr val="bg1"/>
+          </a:solidFill>
+          <a:ln>
+            <a:noFill/>
+          </a:ln>
+        </p:spPr>
+        <p:style>
+          <a:lnRef idx="2">
+            <a:schemeClr val="accent1">
+              <a:shade val="50000"/>
+            </a:schemeClr>
+          </a:lnRef>
+          <a:fillRef idx="1">
+            <a:schemeClr val="accent1"/>
+          </a:fillRef>
+          <a:effectRef idx="0">
+            <a:schemeClr val="accent1"/>
+          </a:effectRef>
+          <a:fontRef idx="minor">
+            <a:schemeClr val="lt1"/>
+          </a:fontRef>
+        </p:style>
+        <p:txBody>
+          <a:bodyPr rtlCol="0" anchor="ctr"/>
+          <a:lstStyle/>
+          <a:p>
+            <a:pPr marL="0" marR="0" lvl="0" indent="0" algn="ctr" defTabSz="914400" eaLnBrk="1" fontAlgn="auto" latinLnBrk="0" hangingPunct="1">
+              <a:lnSpc>
+                <a:spcPct val="100000"/>
+              </a:lnSpc>
+              <a:spcBef>
+                <a:spcPts val="0"/>
+              </a:spcBef>
+              <a:spcAft>
+                <a:spcPts val="0"/>
+              </a:spcAft>
+              <a:buClrTx/>
+              <a:buSzTx/>
+              <a:buFontTx/>
+              <a:buNone/>
+              <a:tabLst/>
+              <a:defRPr/>
+            </a:pPr>
+            <a:endParaRPr kumimoji="0" lang="en-US" sz="1800" b="0" i="0" u="none" strike="noStrike" kern="0" cap="none" spc="0" normalizeH="0" baseline="0" noProof="0">
+              <a:ln>
+                <a:noFill/>
+              </a:ln>
+              <a:solidFill>
+                <a:sysClr val="windowText" lastClr="000000"/>
+              </a:solidFill>
+              <a:effectLst/>
+              <a:uLnTx/>
+              <a:uFillTx/>
+            </a:endParaRPr>
+          </a:p>
+        </p:txBody>
+      </p:sp>
+      <p:sp>
+        <p:nvSpPr>
+          <p:cNvPr id="2" name="Titre 1">
+            <a:extLst>
+              <a:ext uri="{FF2B5EF4-FFF2-40B4-BE49-F238E27FC236}">
+                <a16:creationId xmlns:a16="http://schemas.microsoft.com/office/drawing/2014/main" id="{DC1225BD-6FF6-4E57-B843-0CF71559D3EC}"/>
+              </a:ext>
+            </a:extLst>
+          </p:cNvPr>
+          <p:cNvSpPr>
+            <a:spLocks noGrp="1"/>
+          </p:cNvSpPr>
+          <p:nvPr>
+            <p:ph type="title"/>
+          </p:nvPr>
+        </p:nvSpPr>
+        <p:spPr>
+          <a:xfrm>
+            <a:off x="804672" y="2600325"/>
+            <a:ext cx="4948428" cy="2651200"/>
+          </a:xfrm>
+        </p:spPr>
+        <p:txBody>
+          <a:bodyPr vert="horz" lIns="91440" tIns="45720" rIns="91440" bIns="45720" rtlCol="0" anchor="t">
+            <a:normAutofit/>
+          </a:bodyPr>
+          <a:lstStyle/>
+          <a:p>
+            <a:r>
+              <a:rPr lang="en-US" sz="5400"/>
+              <a:t>Parcours messagerie</a:t>
+            </a:r>
+          </a:p>
+        </p:txBody>
+      </p:sp>
+    </p:spTree>
+    <p:extLst>
+      <p:ext uri="{BB962C8B-B14F-4D97-AF65-F5344CB8AC3E}">
+        <p14:creationId xmlns:p14="http://schemas.microsoft.com/office/powerpoint/2010/main" val="3216512380"/>
+      </p:ext>
+    </p:extLst>
+  </p:cSld>
+  <p:clrMapOvr>
+    <a:overrideClrMapping bg1="dk1" tx1="lt1" bg2="dk2" tx2="lt2" accent1="accent1" accent2="accent2" accent3="accent3" accent4="accent4" accent5="accent5" accent6="accent6" hlink="hlink" folHlink="folHlink"/>
+  </p:clrMapOvr>
+</p:sld>
+</file>
+
+<file path=ppt/slides/slide13.xml><?xml version="1.0" encoding="utf-8"?>
+<p:sld xmlns:a="http://schemas.openxmlformats.org/drawingml/2006/main" xmlns:r="http://schemas.openxmlformats.org/officeDocument/2006/relationships" xmlns:p="http://schemas.openxmlformats.org/presentationml/2006/main">
+  <p:cSld>
+    <p:bg>
+      <p:bgPr>
+        <a:solidFill>
+          <a:schemeClr val="bg1"/>
+        </a:solidFill>
+        <a:effectLst/>
+      </p:bgPr>
+    </p:bg>
+    <p:spTree>
+      <p:nvGrpSpPr>
+        <p:cNvPr id="1" name=""/>
+        <p:cNvGrpSpPr/>
+        <p:nvPr/>
+      </p:nvGrpSpPr>
+      <p:grpSpPr>
+        <a:xfrm>
+          <a:off x="0" y="0"/>
+          <a:ext cx="0" cy="0"/>
+          <a:chOff x="0" y="0"/>
+          <a:chExt cx="0" cy="0"/>
+        </a:xfrm>
+      </p:grpSpPr>
+      <p:cxnSp>
+        <p:nvCxnSpPr>
+          <p:cNvPr id="25" name="Straight Connector 24">
+            <a:extLst>
+              <a:ext uri="{FF2B5EF4-FFF2-40B4-BE49-F238E27FC236}">
+                <a16:creationId xmlns:a16="http://schemas.microsoft.com/office/drawing/2014/main" id="{DFDA47BC-3069-47F5-8257-24B3B1F76A08}"/>
+              </a:ext>
+              <a:ext uri="{C183D7F6-B498-43B3-948B-1728B52AA6E4}">
+                <adec:decorative xmlns:adec="http://schemas.microsoft.com/office/drawing/2017/decorative" val="1"/>
+              </a:ext>
+            </a:extLst>
+          </p:cNvPr>
+          <p:cNvCxnSpPr>
+            <a:cxnSpLocks noGrp="1" noRot="1" noChangeAspect="1" noMove="1" noResize="1" noEditPoints="1" noAdjustHandles="1" noChangeArrowheads="1" noChangeShapeType="1"/>
+          </p:cNvCxnSpPr>
+          <p:nvPr>
+            <p:extLst>
+              <p:ext uri="{386F3935-93C4-4BCD-93E2-E3B085C9AB24}">
+                <p16:designElem xmlns:p16="http://schemas.microsoft.com/office/powerpoint/2015/main" val="1"/>
+              </p:ext>
+            </p:extLst>
+          </p:nvPr>
+        </p:nvCxnSpPr>
+        <p:spPr>
+          <a:xfrm>
+            <a:off x="3129276" y="477749"/>
+            <a:ext cx="0" cy="3657600"/>
+          </a:xfrm>
+          <a:prstGeom prst="line">
+            <a:avLst/>
+          </a:prstGeom>
+          <a:ln w="101600" cmpd="dbl">
+            <a:solidFill>
+              <a:srgbClr val="595959"/>
+            </a:solidFill>
+          </a:ln>
+        </p:spPr>
+        <p:style>
+          <a:lnRef idx="1">
+            <a:schemeClr val="accent1"/>
+          </a:lnRef>
+          <a:fillRef idx="0">
+            <a:schemeClr val="accent1"/>
+          </a:fillRef>
+          <a:effectRef idx="0">
+            <a:schemeClr val="accent1"/>
+          </a:effectRef>
+          <a:fontRef idx="minor">
+            <a:schemeClr val="tx1"/>
+          </a:fontRef>
+        </p:style>
+      </p:cxnSp>
+      <p:pic>
+        <p:nvPicPr>
+          <p:cNvPr id="9" name="Image 8" descr="Une image contenant capture d’écran&#10;&#10;Description générée automatiquement">
+            <a:extLst>
+              <a:ext uri="{FF2B5EF4-FFF2-40B4-BE49-F238E27FC236}">
+                <a16:creationId xmlns:a16="http://schemas.microsoft.com/office/drawing/2014/main" id="{0604267F-B94E-4070-99DD-FBC084A3AA0C}"/>
+              </a:ext>
+            </a:extLst>
+          </p:cNvPr>
+          <p:cNvPicPr>
+            <a:picLocks noChangeAspect="1"/>
+          </p:cNvPicPr>
+          <p:nvPr/>
+        </p:nvPicPr>
+        <p:blipFill>
+          <a:blip r:embed="rId2"/>
+          <a:stretch>
+            <a:fillRect/>
+          </a:stretch>
+        </p:blipFill>
+        <p:spPr>
+          <a:xfrm>
+            <a:off x="6456709" y="307731"/>
+            <a:ext cx="2248670" cy="3997637"/>
+          </a:xfrm>
+          <a:prstGeom prst="rect">
+            <a:avLst/>
+          </a:prstGeom>
+        </p:spPr>
+      </p:pic>
+      <p:sp>
+        <p:nvSpPr>
+          <p:cNvPr id="27" name="Rectangle 26">
+            <a:extLst>
+              <a:ext uri="{FF2B5EF4-FFF2-40B4-BE49-F238E27FC236}">
+                <a16:creationId xmlns:a16="http://schemas.microsoft.com/office/drawing/2014/main" id="{7AE95D8F-9825-4222-8846-E3461598CC62}"/>
+              </a:ext>
+              <a:ext uri="{C183D7F6-B498-43B3-948B-1728B52AA6E4}">
+                <adec:decorative xmlns:adec="http://schemas.microsoft.com/office/drawing/2017/decorative" val="1"/>
+              </a:ext>
+            </a:extLst>
+          </p:cNvPr>
+          <p:cNvSpPr>
+            <a:spLocks noGrp="1" noRot="1" noChangeAspect="1" noMove="1" noResize="1" noEditPoints="1" noAdjustHandles="1" noChangeArrowheads="1" noChangeShapeType="1" noTextEdit="1"/>
+          </p:cNvSpPr>
+          <p:nvPr>
+            <p:extLst>
+              <p:ext uri="{386F3935-93C4-4BCD-93E2-E3B085C9AB24}">
+                <p16:designElem xmlns:p16="http://schemas.microsoft.com/office/powerpoint/2015/main" val="1"/>
+              </p:ext>
+            </p:extLst>
+          </p:nvPr>
+        </p:nvSpPr>
+        <p:spPr bwMode="ltGray">
+          <a:xfrm>
+            <a:off x="378068" y="4633546"/>
+            <a:ext cx="11438793" cy="1844256"/>
+          </a:xfrm>
+          <a:prstGeom prst="rect">
+            <a:avLst/>
+          </a:prstGeom>
+          <a:solidFill>
+            <a:srgbClr val="404040"/>
+          </a:solidFill>
+          <a:ln w="127000" cap="sq" cmpd="thinThick">
+            <a:solidFill>
+              <a:srgbClr val="404040"/>
+            </a:solidFill>
+          </a:ln>
+        </p:spPr>
+        <p:style>
+          <a:lnRef idx="2">
+            <a:schemeClr val="accent1">
+              <a:shade val="50000"/>
+            </a:schemeClr>
+          </a:lnRef>
+          <a:fillRef idx="1">
+            <a:schemeClr val="accent1"/>
+          </a:fillRef>
+          <a:effectRef idx="0">
+            <a:schemeClr val="accent1"/>
+          </a:effectRef>
+          <a:fontRef idx="minor">
+            <a:schemeClr val="lt1"/>
+          </a:fontRef>
+        </p:style>
+        <p:txBody>
+          <a:bodyPr rtlCol="0" anchor="ctr"/>
+          <a:lstStyle/>
+          <a:p>
+            <a:pPr algn="ctr"/>
+            <a:endParaRPr lang="en-US"/>
+          </a:p>
+        </p:txBody>
+      </p:sp>
+      <p:sp>
+        <p:nvSpPr>
+          <p:cNvPr id="2" name="Titre 1">
+            <a:extLst>
+              <a:ext uri="{FF2B5EF4-FFF2-40B4-BE49-F238E27FC236}">
+                <a16:creationId xmlns:a16="http://schemas.microsoft.com/office/drawing/2014/main" id="{2D78D6FE-9ABC-46F1-A2D0-674E2E5D482E}"/>
+              </a:ext>
+            </a:extLst>
+          </p:cNvPr>
+          <p:cNvSpPr>
+            <a:spLocks noGrp="1"/>
+          </p:cNvSpPr>
+          <p:nvPr>
+            <p:ph type="title"/>
+          </p:nvPr>
+        </p:nvSpPr>
+        <p:spPr>
+          <a:xfrm>
+            <a:off x="527538" y="4756638"/>
+            <a:ext cx="11139854" cy="930447"/>
+          </a:xfrm>
+        </p:spPr>
+        <p:txBody>
+          <a:bodyPr vert="horz" lIns="91440" tIns="45720" rIns="91440" bIns="45720" rtlCol="0" anchor="b">
+            <a:normAutofit/>
+          </a:bodyPr>
+          <a:lstStyle/>
+          <a:p>
+            <a:pPr algn="ctr"/>
+            <a:r>
+              <a:rPr lang="en-US" sz="5400">
+                <a:solidFill>
+                  <a:srgbClr val="FFFFFF"/>
+                </a:solidFill>
+              </a:rPr>
+              <a:t>Architecture : connexion</a:t>
+            </a:r>
+          </a:p>
+        </p:txBody>
+      </p:sp>
+      <p:pic>
+        <p:nvPicPr>
+          <p:cNvPr id="5" name="Image 4">
+            <a:extLst>
+              <a:ext uri="{FF2B5EF4-FFF2-40B4-BE49-F238E27FC236}">
+                <a16:creationId xmlns:a16="http://schemas.microsoft.com/office/drawing/2014/main" id="{68B97CDE-2871-4BD9-97E6-DAC6AA98A241}"/>
+              </a:ext>
+            </a:extLst>
+          </p:cNvPr>
+          <p:cNvPicPr>
+            <a:picLocks noChangeAspect="1"/>
+          </p:cNvPicPr>
+          <p:nvPr/>
+        </p:nvPicPr>
+        <p:blipFill>
+          <a:blip r:embed="rId3"/>
+          <a:stretch>
+            <a:fillRect/>
+          </a:stretch>
+        </p:blipFill>
+        <p:spPr>
+          <a:xfrm>
+            <a:off x="525442" y="307731"/>
+            <a:ext cx="2248670" cy="3997637"/>
+          </a:xfrm>
+          <a:prstGeom prst="rect">
+            <a:avLst/>
+          </a:prstGeom>
+        </p:spPr>
+      </p:pic>
+      <p:pic>
+        <p:nvPicPr>
+          <p:cNvPr id="7" name="Image 6" descr="Une image contenant capture d’écran&#10;&#10;Description générée automatiquement">
+            <a:extLst>
+              <a:ext uri="{FF2B5EF4-FFF2-40B4-BE49-F238E27FC236}">
+                <a16:creationId xmlns:a16="http://schemas.microsoft.com/office/drawing/2014/main" id="{085AE162-3950-4B7E-8672-589CEDB9278E}"/>
+              </a:ext>
+            </a:extLst>
+          </p:cNvPr>
+          <p:cNvPicPr>
+            <a:picLocks noChangeAspect="1"/>
+          </p:cNvPicPr>
+          <p:nvPr/>
+        </p:nvPicPr>
+        <p:blipFill>
+          <a:blip r:embed="rId4"/>
+          <a:stretch>
+            <a:fillRect/>
+          </a:stretch>
+        </p:blipFill>
+        <p:spPr>
+          <a:xfrm>
+            <a:off x="3489146" y="307731"/>
+            <a:ext cx="2248670" cy="3997637"/>
+          </a:xfrm>
+          <a:prstGeom prst="rect">
+            <a:avLst/>
+          </a:prstGeom>
+        </p:spPr>
+      </p:pic>
+      <p:cxnSp>
+        <p:nvCxnSpPr>
+          <p:cNvPr id="29" name="Straight Connector 28">
+            <a:extLst>
+              <a:ext uri="{FF2B5EF4-FFF2-40B4-BE49-F238E27FC236}">
+                <a16:creationId xmlns:a16="http://schemas.microsoft.com/office/drawing/2014/main" id="{942B920A-73AD-402A-8EEF-B88E1A9398B8}"/>
+              </a:ext>
+              <a:ext uri="{C183D7F6-B498-43B3-948B-1728B52AA6E4}">
+                <adec:decorative xmlns:adec="http://schemas.microsoft.com/office/drawing/2017/decorative" val="1"/>
+              </a:ext>
+            </a:extLst>
+          </p:cNvPr>
+          <p:cNvCxnSpPr>
+            <a:cxnSpLocks noGrp="1" noRot="1" noChangeAspect="1" noMove="1" noResize="1" noEditPoints="1" noAdjustHandles="1" noChangeArrowheads="1" noChangeShapeType="1"/>
+          </p:cNvCxnSpPr>
+          <p:nvPr>
+            <p:extLst>
+              <p:ext uri="{386F3935-93C4-4BCD-93E2-E3B085C9AB24}">
+                <p16:designElem xmlns:p16="http://schemas.microsoft.com/office/powerpoint/2015/main" val="1"/>
+              </p:ext>
+            </p:extLst>
+          </p:nvPr>
+        </p:nvCxnSpPr>
+        <p:spPr>
+          <a:xfrm>
+            <a:off x="6097686" y="477749"/>
+            <a:ext cx="0" cy="3657600"/>
+          </a:xfrm>
+          <a:prstGeom prst="line">
+            <a:avLst/>
+          </a:prstGeom>
+          <a:ln w="101600" cmpd="dbl">
+            <a:solidFill>
+              <a:srgbClr val="595959"/>
+            </a:solidFill>
+          </a:ln>
+        </p:spPr>
+        <p:style>
+          <a:lnRef idx="1">
+            <a:schemeClr val="accent1"/>
+          </a:lnRef>
+          <a:fillRef idx="0">
+            <a:schemeClr val="accent1"/>
+          </a:fillRef>
+          <a:effectRef idx="0">
+            <a:schemeClr val="accent1"/>
+          </a:effectRef>
+          <a:fontRef idx="minor">
+            <a:schemeClr val="tx1"/>
+          </a:fontRef>
+        </p:style>
+      </p:cxnSp>
+      <p:cxnSp>
+        <p:nvCxnSpPr>
+          <p:cNvPr id="31" name="Straight Connector 30">
+            <a:extLst>
+              <a:ext uri="{FF2B5EF4-FFF2-40B4-BE49-F238E27FC236}">
+                <a16:creationId xmlns:a16="http://schemas.microsoft.com/office/drawing/2014/main" id="{00C9EB70-BC82-414A-BF8D-AD7FC6727616}"/>
+              </a:ext>
+              <a:ext uri="{C183D7F6-B498-43B3-948B-1728B52AA6E4}">
+                <adec:decorative xmlns:adec="http://schemas.microsoft.com/office/drawing/2017/decorative" val="1"/>
+              </a:ext>
+            </a:extLst>
+          </p:cNvPr>
+          <p:cNvCxnSpPr>
+            <a:cxnSpLocks noGrp="1" noRot="1" noChangeAspect="1" noMove="1" noResize="1" noEditPoints="1" noAdjustHandles="1" noChangeArrowheads="1" noChangeShapeType="1"/>
+          </p:cNvCxnSpPr>
+          <p:nvPr>
+            <p:extLst>
+              <p:ext uri="{386F3935-93C4-4BCD-93E2-E3B085C9AB24}">
+                <p16:designElem xmlns:p16="http://schemas.microsoft.com/office/powerpoint/2015/main" val="1"/>
+              </p:ext>
+            </p:extLst>
+          </p:nvPr>
+        </p:nvCxnSpPr>
+        <p:spPr>
+          <a:xfrm>
+            <a:off x="9066096" y="477749"/>
+            <a:ext cx="0" cy="3657600"/>
+          </a:xfrm>
+          <a:prstGeom prst="line">
+            <a:avLst/>
+          </a:prstGeom>
+          <a:ln w="101600" cmpd="dbl">
+            <a:solidFill>
+              <a:srgbClr val="595959"/>
+            </a:solidFill>
+          </a:ln>
+        </p:spPr>
+        <p:style>
+          <a:lnRef idx="1">
+            <a:schemeClr val="accent1"/>
+          </a:lnRef>
+          <a:fillRef idx="0">
+            <a:schemeClr val="accent1"/>
+          </a:fillRef>
+          <a:effectRef idx="0">
+            <a:schemeClr val="accent1"/>
+          </a:effectRef>
+          <a:fontRef idx="minor">
+            <a:schemeClr val="tx1"/>
+          </a:fontRef>
+        </p:style>
+      </p:cxnSp>
+      <p:pic>
+        <p:nvPicPr>
+          <p:cNvPr id="15" name="Image 14">
+            <a:extLst>
+              <a:ext uri="{FF2B5EF4-FFF2-40B4-BE49-F238E27FC236}">
+                <a16:creationId xmlns:a16="http://schemas.microsoft.com/office/drawing/2014/main" id="{ADAD0572-0D9E-46E0-BF29-40BEF8B77ED9}"/>
+              </a:ext>
+            </a:extLst>
+          </p:cNvPr>
+          <p:cNvPicPr>
+            <a:picLocks noChangeAspect="1"/>
+          </p:cNvPicPr>
+          <p:nvPr/>
+        </p:nvPicPr>
+        <p:blipFill>
+          <a:blip r:embed="rId5"/>
+          <a:stretch>
+            <a:fillRect/>
+          </a:stretch>
+        </p:blipFill>
+        <p:spPr>
+          <a:xfrm>
+            <a:off x="9425120" y="330045"/>
+            <a:ext cx="2248670" cy="3997637"/>
+          </a:xfrm>
+          <a:prstGeom prst="rect">
+            <a:avLst/>
+          </a:prstGeom>
+        </p:spPr>
+      </p:pic>
+      <p:cxnSp>
+        <p:nvCxnSpPr>
+          <p:cNvPr id="33" name="Straight Connector 32">
+            <a:extLst>
+              <a:ext uri="{FF2B5EF4-FFF2-40B4-BE49-F238E27FC236}">
+                <a16:creationId xmlns:a16="http://schemas.microsoft.com/office/drawing/2014/main" id="{3217665F-0036-444A-8D4A-33AF36A36A42}"/>
+              </a:ext>
+              <a:ext uri="{C183D7F6-B498-43B3-948B-1728B52AA6E4}">
+                <adec:decorative xmlns:adec="http://schemas.microsoft.com/office/drawing/2017/decorative" val="1"/>
+              </a:ext>
+            </a:extLst>
+          </p:cNvPr>
+          <p:cNvCxnSpPr>
+            <a:cxnSpLocks noGrp="1" noRot="1" noChangeAspect="1" noMove="1" noResize="1" noEditPoints="1" noAdjustHandles="1" noChangeArrowheads="1" noChangeShapeType="1"/>
+          </p:cNvCxnSpPr>
+          <p:nvPr>
+            <p:extLst>
+              <p:ext uri="{386F3935-93C4-4BCD-93E2-E3B085C9AB24}">
+                <p16:designElem xmlns:p16="http://schemas.microsoft.com/office/powerpoint/2015/main" val="1"/>
+              </p:ext>
+            </p:extLst>
+          </p:nvPr>
+        </p:nvCxnSpPr>
+        <p:spPr>
+          <a:xfrm>
+            <a:off x="2209800" y="5738691"/>
+            <a:ext cx="7772400" cy="0"/>
+          </a:xfrm>
+          <a:prstGeom prst="line">
+            <a:avLst/>
+          </a:prstGeom>
+          <a:ln w="22225">
+            <a:solidFill>
+              <a:srgbClr val="D9D9D9"/>
+            </a:solidFill>
+          </a:ln>
+        </p:spPr>
+        <p:style>
+          <a:lnRef idx="1">
+            <a:schemeClr val="accent1"/>
+          </a:lnRef>
+          <a:fillRef idx="0">
+            <a:schemeClr val="accent1"/>
+          </a:fillRef>
+          <a:effectRef idx="0">
+            <a:schemeClr val="accent1"/>
+          </a:effectRef>
+          <a:fontRef idx="minor">
+            <a:schemeClr val="tx1"/>
+          </a:fontRef>
+        </p:style>
+      </p:cxnSp>
+    </p:spTree>
+    <p:extLst>
+      <p:ext uri="{BB962C8B-B14F-4D97-AF65-F5344CB8AC3E}">
+        <p14:creationId xmlns:p14="http://schemas.microsoft.com/office/powerpoint/2010/main" val="860114262"/>
+      </p:ext>
+    </p:extLst>
+  </p:cSld>
+  <p:clrMapOvr>
+    <a:masterClrMapping/>
+  </p:clrMapOvr>
+</p:sld>
+</file>
+
+<file path=ppt/slides/slide14.xml><?xml version="1.0" encoding="utf-8"?>
+<p:sld xmlns:a="http://schemas.openxmlformats.org/drawingml/2006/main" xmlns:r="http://schemas.openxmlformats.org/officeDocument/2006/relationships" xmlns:p="http://schemas.openxmlformats.org/presentationml/2006/main">
+  <p:cSld>
+    <p:bg>
+      <p:bgPr>
+        <a:solidFill>
+          <a:schemeClr val="bg1"/>
+        </a:solidFill>
+        <a:effectLst/>
+      </p:bgPr>
+    </p:bg>
+    <p:spTree>
+      <p:nvGrpSpPr>
+        <p:cNvPr id="1" name=""/>
+        <p:cNvGrpSpPr/>
+        <p:nvPr/>
+      </p:nvGrpSpPr>
+      <p:grpSpPr>
+        <a:xfrm>
+          <a:off x="0" y="0"/>
+          <a:ext cx="0" cy="0"/>
+          <a:chOff x="0" y="0"/>
+          <a:chExt cx="0" cy="0"/>
+        </a:xfrm>
+      </p:grpSpPr>
+      <p:cxnSp>
+        <p:nvCxnSpPr>
+          <p:cNvPr id="11" name="Straight Connector 10">
+            <a:extLst>
+              <a:ext uri="{FF2B5EF4-FFF2-40B4-BE49-F238E27FC236}">
+                <a16:creationId xmlns:a16="http://schemas.microsoft.com/office/drawing/2014/main" id="{99AE2756-0FC4-4155-83E7-58AAAB63E757}"/>
+              </a:ext>
+              <a:ext uri="{C183D7F6-B498-43B3-948B-1728B52AA6E4}">
+                <adec:decorative xmlns:adec="http://schemas.microsoft.com/office/drawing/2017/decorative" val="1"/>
+              </a:ext>
+            </a:extLst>
+          </p:cNvPr>
+          <p:cNvCxnSpPr>
+            <a:cxnSpLocks noGrp="1" noRot="1" noChangeAspect="1" noMove="1" noResize="1" noEditPoints="1" noAdjustHandles="1" noChangeArrowheads="1" noChangeShapeType="1"/>
+          </p:cNvCxnSpPr>
+          <p:nvPr>
+            <p:extLst>
+              <p:ext uri="{386F3935-93C4-4BCD-93E2-E3B085C9AB24}">
+                <p16:designElem xmlns:p16="http://schemas.microsoft.com/office/powerpoint/2015/main" val="1"/>
+              </p:ext>
+            </p:extLst>
+          </p:nvPr>
+        </p:nvCxnSpPr>
+        <p:spPr>
+          <a:xfrm>
+            <a:off x="4065689" y="477749"/>
+            <a:ext cx="0" cy="3657600"/>
+          </a:xfrm>
+          <a:prstGeom prst="line">
+            <a:avLst/>
+          </a:prstGeom>
+          <a:ln w="101600" cmpd="dbl">
+            <a:solidFill>
+              <a:srgbClr val="595959"/>
+            </a:solidFill>
+          </a:ln>
+        </p:spPr>
+        <p:style>
+          <a:lnRef idx="1">
+            <a:schemeClr val="accent1"/>
+          </a:lnRef>
+          <a:fillRef idx="0">
+            <a:schemeClr val="accent1"/>
+          </a:fillRef>
+          <a:effectRef idx="0">
+            <a:schemeClr val="accent1"/>
+          </a:effectRef>
+          <a:fontRef idx="minor">
+            <a:schemeClr val="tx1"/>
+          </a:fontRef>
+        </p:style>
+      </p:cxnSp>
+      <p:sp>
+        <p:nvSpPr>
+          <p:cNvPr id="13" name="Rectangle 12">
+            <a:extLst>
+              <a:ext uri="{FF2B5EF4-FFF2-40B4-BE49-F238E27FC236}">
+                <a16:creationId xmlns:a16="http://schemas.microsoft.com/office/drawing/2014/main" id="{247AB924-1B87-43FC-B7C7-B112D5C51A0E}"/>
+              </a:ext>
+              <a:ext uri="{C183D7F6-B498-43B3-948B-1728B52AA6E4}">
+                <adec:decorative xmlns:adec="http://schemas.microsoft.com/office/drawing/2017/decorative" val="1"/>
+              </a:ext>
+            </a:extLst>
+          </p:cNvPr>
+          <p:cNvSpPr>
+            <a:spLocks noGrp="1" noRot="1" noChangeAspect="1" noMove="1" noResize="1" noEditPoints="1" noAdjustHandles="1" noChangeArrowheads="1" noChangeShapeType="1" noTextEdit="1"/>
+          </p:cNvSpPr>
+          <p:nvPr>
+            <p:extLst>
+              <p:ext uri="{386F3935-93C4-4BCD-93E2-E3B085C9AB24}">
+                <p16:designElem xmlns:p16="http://schemas.microsoft.com/office/powerpoint/2015/main" val="1"/>
+              </p:ext>
+            </p:extLst>
+          </p:nvPr>
+        </p:nvSpPr>
+        <p:spPr bwMode="ltGray">
+          <a:xfrm>
+            <a:off x="378068" y="4633546"/>
+            <a:ext cx="11438793" cy="1844256"/>
+          </a:xfrm>
+          <a:prstGeom prst="rect">
+            <a:avLst/>
+          </a:prstGeom>
+          <a:solidFill>
+            <a:srgbClr val="404040"/>
+          </a:solidFill>
+          <a:ln w="127000" cap="sq" cmpd="thinThick">
+            <a:solidFill>
+              <a:srgbClr val="404040"/>
+            </a:solidFill>
+          </a:ln>
+        </p:spPr>
+        <p:style>
+          <a:lnRef idx="2">
+            <a:schemeClr val="accent1">
+              <a:shade val="50000"/>
+            </a:schemeClr>
+          </a:lnRef>
+          <a:fillRef idx="1">
+            <a:schemeClr val="accent1"/>
+          </a:fillRef>
+          <a:effectRef idx="0">
+            <a:schemeClr val="accent1"/>
+          </a:effectRef>
+          <a:fontRef idx="minor">
+            <a:schemeClr val="lt1"/>
+          </a:fontRef>
+        </p:style>
+        <p:txBody>
+          <a:bodyPr rtlCol="0" anchor="ctr"/>
+          <a:lstStyle/>
+          <a:p>
+            <a:pPr algn="ctr"/>
+            <a:endParaRPr lang="en-US"/>
+          </a:p>
+        </p:txBody>
+      </p:sp>
+      <p:sp>
+        <p:nvSpPr>
+          <p:cNvPr id="2" name="Titre 1">
+            <a:extLst>
+              <a:ext uri="{FF2B5EF4-FFF2-40B4-BE49-F238E27FC236}">
+                <a16:creationId xmlns:a16="http://schemas.microsoft.com/office/drawing/2014/main" id="{D645DA1C-D53A-4876-87EA-8C0CBEED4281}"/>
+              </a:ext>
+            </a:extLst>
+          </p:cNvPr>
+          <p:cNvSpPr>
+            <a:spLocks noGrp="1"/>
+          </p:cNvSpPr>
+          <p:nvPr>
+            <p:ph type="title"/>
+          </p:nvPr>
+        </p:nvSpPr>
+        <p:spPr>
+          <a:xfrm>
+            <a:off x="527538" y="4756638"/>
+            <a:ext cx="11139854" cy="930447"/>
+          </a:xfrm>
+        </p:spPr>
+        <p:txBody>
+          <a:bodyPr vert="horz" lIns="91440" tIns="45720" rIns="91440" bIns="45720" rtlCol="0" anchor="b">
+            <a:normAutofit/>
+          </a:bodyPr>
+          <a:lstStyle/>
+          <a:p>
+            <a:pPr algn="ctr"/>
+            <a:r>
+              <a:rPr lang="en-US" sz="5400">
+                <a:solidFill>
+                  <a:srgbClr val="FFFFFF"/>
+                </a:solidFill>
+              </a:rPr>
+              <a:t>Authentification Firebase</a:t>
+            </a:r>
+          </a:p>
+        </p:txBody>
+      </p:sp>
+      <p:pic>
+        <p:nvPicPr>
+          <p:cNvPr id="4" name="Picture 8" descr="RÃ©sultat de recherche d'images pour &quot;firebase realtime database&quot;">
+            <a:extLst>
+              <a:ext uri="{FF2B5EF4-FFF2-40B4-BE49-F238E27FC236}">
+                <a16:creationId xmlns:a16="http://schemas.microsoft.com/office/drawing/2014/main" id="{C7411243-B256-4458-A51E-F0494305698E}"/>
+              </a:ext>
+            </a:extLst>
+          </p:cNvPr>
+          <p:cNvPicPr>
+            <a:picLocks noChangeAspect="1" noChangeArrowheads="1"/>
+          </p:cNvPicPr>
+          <p:nvPr/>
+        </p:nvPicPr>
+        <p:blipFill>
+          <a:blip r:embed="rId2">
+            <a:extLst>
+              <a:ext uri="{28A0092B-C50C-407E-A947-70E740481C1C}">
+                <a14:useLocalDpi xmlns:a14="http://schemas.microsoft.com/office/drawing/2010/main" val="0"/>
+              </a:ext>
+            </a:extLst>
+          </a:blip>
+          <a:stretch>
+            <a:fillRect/>
+          </a:stretch>
+        </p:blipFill>
+        <p:spPr bwMode="auto">
+          <a:xfrm>
+            <a:off x="320040" y="593745"/>
+            <a:ext cx="3425609" cy="3425609"/>
+          </a:xfrm>
+          <a:prstGeom prst="rect">
+            <a:avLst/>
+          </a:prstGeom>
+          <a:noFill/>
+          <a:extLst>
+            <a:ext uri="{909E8E84-426E-40DD-AFC4-6F175D3DCCD1}">
+              <a14:hiddenFill xmlns:a14="http://schemas.microsoft.com/office/drawing/2010/main">
+                <a:solidFill>
+                  <a:srgbClr val="FFFFFF"/>
+                </a:solidFill>
+              </a14:hiddenFill>
+            </a:ext>
+          </a:extLst>
+        </p:spPr>
+      </p:pic>
+      <p:pic>
+        <p:nvPicPr>
+          <p:cNvPr id="5" name="Image 4">
+            <a:extLst>
+              <a:ext uri="{FF2B5EF4-FFF2-40B4-BE49-F238E27FC236}">
+                <a16:creationId xmlns:a16="http://schemas.microsoft.com/office/drawing/2014/main" id="{F241D96E-81ED-4970-A9BF-6D4E42E61C11}"/>
+              </a:ext>
+            </a:extLst>
+          </p:cNvPr>
+          <p:cNvPicPr>
+            <a:picLocks noChangeAspect="1"/>
+          </p:cNvPicPr>
+          <p:nvPr/>
+        </p:nvPicPr>
+        <p:blipFill>
+          <a:blip r:embed="rId3"/>
+          <a:stretch>
+            <a:fillRect/>
+          </a:stretch>
+        </p:blipFill>
+        <p:spPr>
+          <a:xfrm>
+            <a:off x="4385729" y="1336636"/>
+            <a:ext cx="3433324" cy="1939827"/>
+          </a:xfrm>
+          <a:prstGeom prst="rect">
+            <a:avLst/>
+          </a:prstGeom>
+        </p:spPr>
+      </p:pic>
+      <p:cxnSp>
+        <p:nvCxnSpPr>
+          <p:cNvPr id="15" name="Straight Connector 14">
+            <a:extLst>
+              <a:ext uri="{FF2B5EF4-FFF2-40B4-BE49-F238E27FC236}">
+                <a16:creationId xmlns:a16="http://schemas.microsoft.com/office/drawing/2014/main" id="{818DC98F-4057-4645-B948-F604F39A9CFE}"/>
+              </a:ext>
+              <a:ext uri="{C183D7F6-B498-43B3-948B-1728B52AA6E4}">
+                <adec:decorative xmlns:adec="http://schemas.microsoft.com/office/drawing/2017/decorative" val="1"/>
+              </a:ext>
+            </a:extLst>
+          </p:cNvPr>
+          <p:cNvCxnSpPr>
+            <a:cxnSpLocks noGrp="1" noRot="1" noChangeAspect="1" noMove="1" noResize="1" noEditPoints="1" noAdjustHandles="1" noChangeArrowheads="1" noChangeShapeType="1"/>
+          </p:cNvCxnSpPr>
+          <p:nvPr>
+            <p:extLst>
+              <p:ext uri="{386F3935-93C4-4BCD-93E2-E3B085C9AB24}">
+                <p16:designElem xmlns:p16="http://schemas.microsoft.com/office/powerpoint/2015/main" val="1"/>
+              </p:ext>
+            </p:extLst>
+          </p:nvPr>
+        </p:nvCxnSpPr>
+        <p:spPr>
+          <a:xfrm>
+            <a:off x="8153400" y="477749"/>
+            <a:ext cx="0" cy="3657600"/>
+          </a:xfrm>
+          <a:prstGeom prst="line">
+            <a:avLst/>
+          </a:prstGeom>
+          <a:ln w="101600" cmpd="dbl">
+            <a:solidFill>
+              <a:srgbClr val="595959"/>
+            </a:solidFill>
+          </a:ln>
+        </p:spPr>
+        <p:style>
+          <a:lnRef idx="1">
+            <a:schemeClr val="accent1"/>
+          </a:lnRef>
+          <a:fillRef idx="0">
+            <a:schemeClr val="accent1"/>
+          </a:fillRef>
+          <a:effectRef idx="0">
+            <a:schemeClr val="accent1"/>
+          </a:effectRef>
+          <a:fontRef idx="minor">
+            <a:schemeClr val="tx1"/>
+          </a:fontRef>
+        </p:style>
+      </p:cxnSp>
+      <p:pic>
+        <p:nvPicPr>
+          <p:cNvPr id="6" name="Image 5">
+            <a:extLst>
+              <a:ext uri="{FF2B5EF4-FFF2-40B4-BE49-F238E27FC236}">
+                <a16:creationId xmlns:a16="http://schemas.microsoft.com/office/drawing/2014/main" id="{E5DD3474-E551-4F88-8DB8-A1EE2FA8F9DF}"/>
+              </a:ext>
+            </a:extLst>
+          </p:cNvPr>
+          <p:cNvPicPr>
+            <a:picLocks noChangeAspect="1"/>
+          </p:cNvPicPr>
+          <p:nvPr/>
+        </p:nvPicPr>
+        <p:blipFill>
+          <a:blip r:embed="rId4"/>
+          <a:stretch>
+            <a:fillRect/>
+          </a:stretch>
+        </p:blipFill>
+        <p:spPr>
+          <a:xfrm>
+            <a:off x="8449725" y="545574"/>
+            <a:ext cx="3423916" cy="3566578"/>
+          </a:xfrm>
+          <a:prstGeom prst="rect">
+            <a:avLst/>
+          </a:prstGeom>
+        </p:spPr>
+      </p:pic>
+      <p:cxnSp>
+        <p:nvCxnSpPr>
+          <p:cNvPr id="17" name="Straight Connector 16">
+            <a:extLst>
+              <a:ext uri="{FF2B5EF4-FFF2-40B4-BE49-F238E27FC236}">
+                <a16:creationId xmlns:a16="http://schemas.microsoft.com/office/drawing/2014/main" id="{DAD2B705-4A9B-408D-AA80-4F41045E09DE}"/>
+              </a:ext>
+              <a:ext uri="{C183D7F6-B498-43B3-948B-1728B52AA6E4}">
+                <adec:decorative xmlns:adec="http://schemas.microsoft.com/office/drawing/2017/decorative" val="1"/>
+              </a:ext>
+            </a:extLst>
+          </p:cNvPr>
+          <p:cNvCxnSpPr>
+            <a:cxnSpLocks noGrp="1" noRot="1" noChangeAspect="1" noMove="1" noResize="1" noEditPoints="1" noAdjustHandles="1" noChangeArrowheads="1" noChangeShapeType="1"/>
+          </p:cNvCxnSpPr>
+          <p:nvPr>
+            <p:extLst>
+              <p:ext uri="{386F3935-93C4-4BCD-93E2-E3B085C9AB24}">
+                <p16:designElem xmlns:p16="http://schemas.microsoft.com/office/powerpoint/2015/main" val="1"/>
+              </p:ext>
+            </p:extLst>
+          </p:nvPr>
+        </p:nvCxnSpPr>
+        <p:spPr>
+          <a:xfrm>
+            <a:off x="2209800" y="5738691"/>
+            <a:ext cx="7772400" cy="0"/>
+          </a:xfrm>
+          <a:prstGeom prst="line">
+            <a:avLst/>
+          </a:prstGeom>
+          <a:ln w="22225">
+            <a:solidFill>
+              <a:srgbClr val="D9D9D9"/>
+            </a:solidFill>
+          </a:ln>
+        </p:spPr>
+        <p:style>
+          <a:lnRef idx="1">
+            <a:schemeClr val="accent1"/>
+          </a:lnRef>
+          <a:fillRef idx="0">
+            <a:schemeClr val="accent1"/>
+          </a:fillRef>
+          <a:effectRef idx="0">
+            <a:schemeClr val="accent1"/>
+          </a:effectRef>
+          <a:fontRef idx="minor">
+            <a:schemeClr val="tx1"/>
+          </a:fontRef>
+        </p:style>
+      </p:cxnSp>
+    </p:spTree>
+    <p:extLst>
+      <p:ext uri="{BB962C8B-B14F-4D97-AF65-F5344CB8AC3E}">
+        <p14:creationId xmlns:p14="http://schemas.microsoft.com/office/powerpoint/2010/main" val="1016840341"/>
+      </p:ext>
+    </p:extLst>
+  </p:cSld>
+  <p:clrMapOvr>
+    <a:masterClrMapping/>
+  </p:clrMapOvr>
+</p:sld>
+</file>
+
+<file path=ppt/slides/slide15.xml><?xml version="1.0" encoding="utf-8"?>
+<p:sld xmlns:a="http://schemas.openxmlformats.org/drawingml/2006/main" xmlns:r="http://schemas.openxmlformats.org/officeDocument/2006/relationships" xmlns:p="http://schemas.openxmlformats.org/presentationml/2006/main">
+  <p:cSld>
+    <p:bg>
+      <p:bgPr>
+        <a:solidFill>
+          <a:schemeClr val="bg1"/>
+        </a:solidFill>
+        <a:effectLst/>
+      </p:bgPr>
+    </p:bg>
+    <p:spTree>
+      <p:nvGrpSpPr>
+        <p:cNvPr id="1" name=""/>
+        <p:cNvGrpSpPr/>
+        <p:nvPr/>
+      </p:nvGrpSpPr>
+      <p:grpSpPr>
+        <a:xfrm>
+          <a:off x="0" y="0"/>
+          <a:ext cx="0" cy="0"/>
+          <a:chOff x="0" y="0"/>
+          <a:chExt cx="0" cy="0"/>
+        </a:xfrm>
+      </p:grpSpPr>
+      <p:cxnSp>
+        <p:nvCxnSpPr>
+          <p:cNvPr id="33" name="Straight Connector 32">
+            <a:extLst>
+              <a:ext uri="{FF2B5EF4-FFF2-40B4-BE49-F238E27FC236}">
+                <a16:creationId xmlns:a16="http://schemas.microsoft.com/office/drawing/2014/main" id="{DFDA47BC-3069-47F5-8257-24B3B1F76A08}"/>
+              </a:ext>
+              <a:ext uri="{C183D7F6-B498-43B3-948B-1728B52AA6E4}">
+                <adec:decorative xmlns:adec="http://schemas.microsoft.com/office/drawing/2017/decorative" val="1"/>
+              </a:ext>
+            </a:extLst>
+          </p:cNvPr>
+          <p:cNvCxnSpPr>
+            <a:cxnSpLocks noGrp="1" noRot="1" noChangeAspect="1" noMove="1" noResize="1" noEditPoints="1" noAdjustHandles="1" noChangeArrowheads="1" noChangeShapeType="1"/>
+          </p:cNvCxnSpPr>
+          <p:nvPr>
+            <p:extLst>
+              <p:ext uri="{386F3935-93C4-4BCD-93E2-E3B085C9AB24}">
+                <p16:designElem xmlns:p16="http://schemas.microsoft.com/office/powerpoint/2015/main" val="1"/>
+              </p:ext>
+            </p:extLst>
+          </p:nvPr>
+        </p:nvCxnSpPr>
+        <p:spPr>
+          <a:xfrm>
+            <a:off x="3129276" y="477749"/>
+            <a:ext cx="0" cy="3657600"/>
+          </a:xfrm>
+          <a:prstGeom prst="line">
+            <a:avLst/>
+          </a:prstGeom>
+          <a:ln w="101600" cmpd="dbl">
+            <a:solidFill>
+              <a:srgbClr val="595959"/>
+            </a:solidFill>
+          </a:ln>
+        </p:spPr>
+        <p:style>
+          <a:lnRef idx="1">
+            <a:schemeClr val="accent1"/>
+          </a:lnRef>
+          <a:fillRef idx="0">
+            <a:schemeClr val="accent1"/>
+          </a:fillRef>
+          <a:effectRef idx="0">
+            <a:schemeClr val="accent1"/>
+          </a:effectRef>
+          <a:fontRef idx="minor">
+            <a:schemeClr val="tx1"/>
+          </a:fontRef>
+        </p:style>
+      </p:cxnSp>
+      <p:pic>
+        <p:nvPicPr>
+          <p:cNvPr id="11" name="Image 10">
+            <a:extLst>
+              <a:ext uri="{FF2B5EF4-FFF2-40B4-BE49-F238E27FC236}">
+                <a16:creationId xmlns:a16="http://schemas.microsoft.com/office/drawing/2014/main" id="{2DAA3DFA-5065-42DB-9819-71C5206C2C94}"/>
+              </a:ext>
+            </a:extLst>
+          </p:cNvPr>
+          <p:cNvPicPr>
+            <a:picLocks noChangeAspect="1"/>
+          </p:cNvPicPr>
+          <p:nvPr/>
+        </p:nvPicPr>
+        <p:blipFill>
+          <a:blip r:embed="rId2"/>
+          <a:stretch>
+            <a:fillRect/>
+          </a:stretch>
+        </p:blipFill>
+        <p:spPr>
+          <a:xfrm>
+            <a:off x="375139" y="307729"/>
+            <a:ext cx="2248670" cy="3997637"/>
+          </a:xfrm>
+          <a:prstGeom prst="rect">
+            <a:avLst/>
+          </a:prstGeom>
+        </p:spPr>
+      </p:pic>
+      <p:sp>
+        <p:nvSpPr>
+          <p:cNvPr id="35" name="Rectangle 34">
+            <a:extLst>
+              <a:ext uri="{FF2B5EF4-FFF2-40B4-BE49-F238E27FC236}">
+                <a16:creationId xmlns:a16="http://schemas.microsoft.com/office/drawing/2014/main" id="{7AE95D8F-9825-4222-8846-E3461598CC62}"/>
+              </a:ext>
+              <a:ext uri="{C183D7F6-B498-43B3-948B-1728B52AA6E4}">
+                <adec:decorative xmlns:adec="http://schemas.microsoft.com/office/drawing/2017/decorative" val="1"/>
+              </a:ext>
+            </a:extLst>
+          </p:cNvPr>
+          <p:cNvSpPr>
+            <a:spLocks noGrp="1" noRot="1" noChangeAspect="1" noMove="1" noResize="1" noEditPoints="1" noAdjustHandles="1" noChangeArrowheads="1" noChangeShapeType="1" noTextEdit="1"/>
+          </p:cNvSpPr>
+          <p:nvPr>
+            <p:extLst>
+              <p:ext uri="{386F3935-93C4-4BCD-93E2-E3B085C9AB24}">
+                <p16:designElem xmlns:p16="http://schemas.microsoft.com/office/powerpoint/2015/main" val="1"/>
+              </p:ext>
+            </p:extLst>
+          </p:nvPr>
+        </p:nvSpPr>
+        <p:spPr bwMode="ltGray">
+          <a:xfrm>
+            <a:off x="378068" y="4633546"/>
+            <a:ext cx="11438793" cy="1844256"/>
+          </a:xfrm>
+          <a:prstGeom prst="rect">
+            <a:avLst/>
+          </a:prstGeom>
+          <a:solidFill>
+            <a:srgbClr val="404040"/>
+          </a:solidFill>
+          <a:ln w="127000" cap="sq" cmpd="thinThick">
+            <a:solidFill>
+              <a:srgbClr val="404040"/>
+            </a:solidFill>
+          </a:ln>
+        </p:spPr>
+        <p:style>
+          <a:lnRef idx="2">
+            <a:schemeClr val="accent1">
+              <a:shade val="50000"/>
+            </a:schemeClr>
+          </a:lnRef>
+          <a:fillRef idx="1">
+            <a:schemeClr val="accent1"/>
+          </a:fillRef>
+          <a:effectRef idx="0">
+            <a:schemeClr val="accent1"/>
+          </a:effectRef>
+          <a:fontRef idx="minor">
+            <a:schemeClr val="lt1"/>
+          </a:fontRef>
+        </p:style>
+        <p:txBody>
+          <a:bodyPr rtlCol="0" anchor="ctr"/>
+          <a:lstStyle/>
+          <a:p>
+            <a:pPr algn="ctr"/>
+            <a:endParaRPr lang="en-US"/>
+          </a:p>
+        </p:txBody>
+      </p:sp>
+      <p:sp>
+        <p:nvSpPr>
+          <p:cNvPr id="2" name="Titre 1">
+            <a:extLst>
+              <a:ext uri="{FF2B5EF4-FFF2-40B4-BE49-F238E27FC236}">
+                <a16:creationId xmlns:a16="http://schemas.microsoft.com/office/drawing/2014/main" id="{2A5FE1EB-629C-4113-BDE3-269F2FA3DDD9}"/>
+              </a:ext>
+            </a:extLst>
+          </p:cNvPr>
+          <p:cNvSpPr>
+            <a:spLocks noGrp="1"/>
+          </p:cNvSpPr>
+          <p:nvPr>
+            <p:ph type="title"/>
+          </p:nvPr>
+        </p:nvSpPr>
+        <p:spPr>
+          <a:xfrm>
+            <a:off x="527538" y="4756638"/>
+            <a:ext cx="11139854" cy="930447"/>
+          </a:xfrm>
+          <a:prstGeom prst="ellipse">
+            <a:avLst/>
+          </a:prstGeom>
+        </p:spPr>
+        <p:txBody>
+          <a:bodyPr vert="horz" lIns="91440" tIns="45720" rIns="91440" bIns="45720" rtlCol="0" anchor="b">
+            <a:normAutofit/>
+          </a:bodyPr>
+          <a:lstStyle/>
+          <a:p>
+            <a:pPr algn="ctr"/>
+            <a:r>
+              <a:rPr lang="en-US" sz="3800" dirty="0">
+                <a:solidFill>
+                  <a:srgbClr val="FFFFFF"/>
+                </a:solidFill>
+              </a:rPr>
+              <a:t>Architecture</a:t>
+            </a:r>
+          </a:p>
+        </p:txBody>
+      </p:sp>
+      <p:pic>
+        <p:nvPicPr>
+          <p:cNvPr id="28" name="Image 27">
+            <a:extLst>
+              <a:ext uri="{FF2B5EF4-FFF2-40B4-BE49-F238E27FC236}">
+                <a16:creationId xmlns:a16="http://schemas.microsoft.com/office/drawing/2014/main" id="{24FBBAFA-9906-4F97-A0BB-D3FC3F8AB8FA}"/>
+              </a:ext>
+            </a:extLst>
+          </p:cNvPr>
+          <p:cNvPicPr>
+            <a:picLocks noChangeAspect="1"/>
+          </p:cNvPicPr>
+          <p:nvPr/>
+        </p:nvPicPr>
+        <p:blipFill>
+          <a:blip r:embed="rId3"/>
+          <a:stretch>
+            <a:fillRect/>
+          </a:stretch>
+        </p:blipFill>
+        <p:spPr>
+          <a:xfrm>
+            <a:off x="9568191" y="307731"/>
+            <a:ext cx="2248670" cy="3997637"/>
+          </a:xfrm>
+          <a:prstGeom prst="rect">
+            <a:avLst/>
+          </a:prstGeom>
+        </p:spPr>
+      </p:pic>
+      <p:pic>
+        <p:nvPicPr>
+          <p:cNvPr id="5" name="Image 4">
+            <a:extLst>
+              <a:ext uri="{FF2B5EF4-FFF2-40B4-BE49-F238E27FC236}">
+                <a16:creationId xmlns:a16="http://schemas.microsoft.com/office/drawing/2014/main" id="{37C8B2AB-CA8C-49D3-9E70-D8BD8EBED326}"/>
+              </a:ext>
+            </a:extLst>
+          </p:cNvPr>
+          <p:cNvPicPr>
+            <a:picLocks noChangeAspect="1"/>
+          </p:cNvPicPr>
+          <p:nvPr/>
+        </p:nvPicPr>
+        <p:blipFill>
+          <a:blip r:embed="rId4"/>
+          <a:stretch>
+            <a:fillRect/>
+          </a:stretch>
+        </p:blipFill>
+        <p:spPr>
+          <a:xfrm>
+            <a:off x="3489146" y="307731"/>
+            <a:ext cx="2248670" cy="3997637"/>
+          </a:xfrm>
+          <a:prstGeom prst="rect">
+            <a:avLst/>
+          </a:prstGeom>
+        </p:spPr>
+      </p:pic>
+      <p:cxnSp>
+        <p:nvCxnSpPr>
+          <p:cNvPr id="37" name="Straight Connector 36">
+            <a:extLst>
+              <a:ext uri="{FF2B5EF4-FFF2-40B4-BE49-F238E27FC236}">
+                <a16:creationId xmlns:a16="http://schemas.microsoft.com/office/drawing/2014/main" id="{942B920A-73AD-402A-8EEF-B88E1A9398B8}"/>
+              </a:ext>
+              <a:ext uri="{C183D7F6-B498-43B3-948B-1728B52AA6E4}">
+                <adec:decorative xmlns:adec="http://schemas.microsoft.com/office/drawing/2017/decorative" val="1"/>
+              </a:ext>
+            </a:extLst>
+          </p:cNvPr>
+          <p:cNvCxnSpPr>
+            <a:cxnSpLocks noGrp="1" noRot="1" noChangeAspect="1" noMove="1" noResize="1" noEditPoints="1" noAdjustHandles="1" noChangeArrowheads="1" noChangeShapeType="1"/>
+          </p:cNvCxnSpPr>
+          <p:nvPr>
+            <p:extLst>
+              <p:ext uri="{386F3935-93C4-4BCD-93E2-E3B085C9AB24}">
+                <p16:designElem xmlns:p16="http://schemas.microsoft.com/office/powerpoint/2015/main" val="1"/>
+              </p:ext>
+            </p:extLst>
+          </p:nvPr>
+        </p:nvCxnSpPr>
+        <p:spPr>
+          <a:xfrm>
+            <a:off x="6097686" y="477749"/>
+            <a:ext cx="0" cy="3657600"/>
+          </a:xfrm>
+          <a:prstGeom prst="line">
+            <a:avLst/>
+          </a:prstGeom>
+          <a:ln w="101600" cmpd="dbl">
+            <a:solidFill>
+              <a:srgbClr val="595959"/>
+            </a:solidFill>
+          </a:ln>
+        </p:spPr>
+        <p:style>
+          <a:lnRef idx="1">
+            <a:schemeClr val="accent1"/>
+          </a:lnRef>
+          <a:fillRef idx="0">
+            <a:schemeClr val="accent1"/>
+          </a:fillRef>
+          <a:effectRef idx="0">
+            <a:schemeClr val="accent1"/>
+          </a:effectRef>
+          <a:fontRef idx="minor">
+            <a:schemeClr val="tx1"/>
+          </a:fontRef>
+        </p:style>
+      </p:cxnSp>
+      <p:cxnSp>
+        <p:nvCxnSpPr>
+          <p:cNvPr id="39" name="Straight Connector 38">
+            <a:extLst>
+              <a:ext uri="{FF2B5EF4-FFF2-40B4-BE49-F238E27FC236}">
+                <a16:creationId xmlns:a16="http://schemas.microsoft.com/office/drawing/2014/main" id="{00C9EB70-BC82-414A-BF8D-AD7FC6727616}"/>
+              </a:ext>
+              <a:ext uri="{C183D7F6-B498-43B3-948B-1728B52AA6E4}">
+                <adec:decorative xmlns:adec="http://schemas.microsoft.com/office/drawing/2017/decorative" val="1"/>
+              </a:ext>
+            </a:extLst>
+          </p:cNvPr>
+          <p:cNvCxnSpPr>
+            <a:cxnSpLocks noGrp="1" noRot="1" noChangeAspect="1" noMove="1" noResize="1" noEditPoints="1" noAdjustHandles="1" noChangeArrowheads="1" noChangeShapeType="1"/>
+          </p:cNvCxnSpPr>
+          <p:nvPr>
+            <p:extLst>
+              <p:ext uri="{386F3935-93C4-4BCD-93E2-E3B085C9AB24}">
+                <p16:designElem xmlns:p16="http://schemas.microsoft.com/office/powerpoint/2015/main" val="1"/>
+              </p:ext>
+            </p:extLst>
+          </p:nvPr>
+        </p:nvCxnSpPr>
+        <p:spPr>
+          <a:xfrm>
+            <a:off x="9066096" y="477749"/>
+            <a:ext cx="0" cy="3657600"/>
+          </a:xfrm>
+          <a:prstGeom prst="line">
+            <a:avLst/>
+          </a:prstGeom>
+          <a:ln w="101600" cmpd="dbl">
+            <a:solidFill>
+              <a:srgbClr val="595959"/>
+            </a:solidFill>
+          </a:ln>
+        </p:spPr>
+        <p:style>
+          <a:lnRef idx="1">
+            <a:schemeClr val="accent1"/>
+          </a:lnRef>
+          <a:fillRef idx="0">
+            <a:schemeClr val="accent1"/>
+          </a:fillRef>
+          <a:effectRef idx="0">
+            <a:schemeClr val="accent1"/>
+          </a:effectRef>
+          <a:fontRef idx="minor">
+            <a:schemeClr val="tx1"/>
+          </a:fontRef>
+        </p:style>
+      </p:cxnSp>
+      <p:pic>
+        <p:nvPicPr>
+          <p:cNvPr id="25" name="Image 24" descr="Une image contenant capture d’écran&#10;&#10;Description générée automatiquement">
+            <a:extLst>
+              <a:ext uri="{FF2B5EF4-FFF2-40B4-BE49-F238E27FC236}">
+                <a16:creationId xmlns:a16="http://schemas.microsoft.com/office/drawing/2014/main" id="{EFDEC614-505C-4F2A-95D2-650067F9D090}"/>
+              </a:ext>
+            </a:extLst>
+          </p:cNvPr>
+          <p:cNvPicPr>
+            <a:picLocks noChangeAspect="1"/>
+          </p:cNvPicPr>
+          <p:nvPr/>
+        </p:nvPicPr>
+        <p:blipFill>
+          <a:blip r:embed="rId5"/>
+          <a:stretch>
+            <a:fillRect/>
+          </a:stretch>
+        </p:blipFill>
+        <p:spPr>
+          <a:xfrm>
+            <a:off x="6457555" y="307730"/>
+            <a:ext cx="2248670" cy="3997637"/>
+          </a:xfrm>
+          <a:prstGeom prst="rect">
+            <a:avLst/>
+          </a:prstGeom>
+        </p:spPr>
+      </p:pic>
+      <p:cxnSp>
+        <p:nvCxnSpPr>
+          <p:cNvPr id="41" name="Straight Connector 40">
+            <a:extLst>
+              <a:ext uri="{FF2B5EF4-FFF2-40B4-BE49-F238E27FC236}">
+                <a16:creationId xmlns:a16="http://schemas.microsoft.com/office/drawing/2014/main" id="{3217665F-0036-444A-8D4A-33AF36A36A42}"/>
+              </a:ext>
+              <a:ext uri="{C183D7F6-B498-43B3-948B-1728B52AA6E4}">
+                <adec:decorative xmlns:adec="http://schemas.microsoft.com/office/drawing/2017/decorative" val="1"/>
+              </a:ext>
+            </a:extLst>
+          </p:cNvPr>
+          <p:cNvCxnSpPr>
+            <a:cxnSpLocks noGrp="1" noRot="1" noChangeAspect="1" noMove="1" noResize="1" noEditPoints="1" noAdjustHandles="1" noChangeArrowheads="1" noChangeShapeType="1"/>
+          </p:cNvCxnSpPr>
+          <p:nvPr>
+            <p:extLst>
+              <p:ext uri="{386F3935-93C4-4BCD-93E2-E3B085C9AB24}">
+                <p16:designElem xmlns:p16="http://schemas.microsoft.com/office/powerpoint/2015/main" val="1"/>
+              </p:ext>
+            </p:extLst>
+          </p:nvPr>
+        </p:nvCxnSpPr>
+        <p:spPr>
+          <a:xfrm>
+            <a:off x="2209800" y="5738691"/>
+            <a:ext cx="7772400" cy="0"/>
+          </a:xfrm>
+          <a:prstGeom prst="line">
+            <a:avLst/>
+          </a:prstGeom>
+          <a:ln w="22225">
+            <a:solidFill>
+              <a:srgbClr val="D9D9D9"/>
+            </a:solidFill>
+          </a:ln>
+        </p:spPr>
+        <p:style>
+          <a:lnRef idx="1">
+            <a:schemeClr val="accent1"/>
+          </a:lnRef>
+          <a:fillRef idx="0">
+            <a:schemeClr val="accent1"/>
+          </a:fillRef>
+          <a:effectRef idx="0">
+            <a:schemeClr val="accent1"/>
+          </a:effectRef>
+          <a:fontRef idx="minor">
+            <a:schemeClr val="tx1"/>
+          </a:fontRef>
+        </p:style>
+      </p:cxnSp>
+    </p:spTree>
+    <p:extLst>
+      <p:ext uri="{BB962C8B-B14F-4D97-AF65-F5344CB8AC3E}">
+        <p14:creationId xmlns:p14="http://schemas.microsoft.com/office/powerpoint/2010/main" val="484301514"/>
+      </p:ext>
+    </p:extLst>
+  </p:cSld>
+  <p:clrMapOvr>
+    <a:masterClrMapping/>
+  </p:clrMapOvr>
+</p:sld>
+</file>
+
+<file path=ppt/slides/slide16.xml><?xml version="1.0" encoding="utf-8"?>
+<p:sld xmlns:a="http://schemas.openxmlformats.org/drawingml/2006/main" xmlns:r="http://schemas.openxmlformats.org/officeDocument/2006/relationships" xmlns:p="http://schemas.openxmlformats.org/presentationml/2006/main">
+  <p:cSld>
+    <p:spTree>
+      <p:nvGrpSpPr>
+        <p:cNvPr id="1" name=""/>
+        <p:cNvGrpSpPr/>
+        <p:nvPr/>
+      </p:nvGrpSpPr>
+      <p:grpSpPr>
+        <a:xfrm>
+          <a:off x="0" y="0"/>
+          <a:ext cx="0" cy="0"/>
+          <a:chOff x="0" y="0"/>
+          <a:chExt cx="0" cy="0"/>
+        </a:xfrm>
+      </p:grpSpPr>
+      <p:sp>
+        <p:nvSpPr>
+          <p:cNvPr id="2" name="Titre 1">
+            <a:extLst>
+              <a:ext uri="{FF2B5EF4-FFF2-40B4-BE49-F238E27FC236}">
+                <a16:creationId xmlns:a16="http://schemas.microsoft.com/office/drawing/2014/main" id="{C391FC08-C345-4791-A78D-228F53262CA7}"/>
+              </a:ext>
+            </a:extLst>
+          </p:cNvPr>
+          <p:cNvSpPr>
+            <a:spLocks noGrp="1"/>
+          </p:cNvSpPr>
+          <p:nvPr>
+            <p:ph type="title"/>
+          </p:nvPr>
+        </p:nvSpPr>
+        <p:spPr/>
+        <p:txBody>
+          <a:bodyPr/>
+          <a:lstStyle/>
+          <a:p>
+            <a:r>
+              <a:rPr lang="fr-FR" dirty="0"/>
+              <a:t>Vidéo de présentation</a:t>
+            </a:r>
+          </a:p>
+        </p:txBody>
+      </p:sp>
+    </p:spTree>
+    <p:extLst>
+      <p:ext uri="{BB962C8B-B14F-4D97-AF65-F5344CB8AC3E}">
+        <p14:creationId xmlns:p14="http://schemas.microsoft.com/office/powerpoint/2010/main" val="1373203736"/>
+      </p:ext>
+    </p:extLst>
+  </p:cSld>
+  <p:clrMapOvr>
+    <a:masterClrMapping/>
+  </p:clrMapOvr>
+</p:sld>
+</file>
+
+<file path=ppt/slides/slide17.xml><?xml version="1.0" encoding="utf-8"?>
+<p:sld xmlns:a="http://schemas.openxmlformats.org/drawingml/2006/main" xmlns:r="http://schemas.openxmlformats.org/officeDocument/2006/relationships" xmlns:p="http://schemas.openxmlformats.org/presentationml/2006/main">
+  <p:cSld>
+    <p:bg>
+      <p:bgPr>
+        <a:solidFill>
+          <a:schemeClr val="bg1">
+            <a:tint val="95000"/>
+            <a:satMod val="170000"/>
+          </a:schemeClr>
+        </a:solidFill>
+        <a:effectLst/>
+      </p:bgPr>
+    </p:bg>
+    <p:spTree>
+      <p:nvGrpSpPr>
+        <p:cNvPr id="1" name=""/>
+        <p:cNvGrpSpPr/>
+        <p:nvPr/>
+      </p:nvGrpSpPr>
+      <p:grpSpPr>
+        <a:xfrm>
+          <a:off x="0" y="0"/>
+          <a:ext cx="0" cy="0"/>
+          <a:chOff x="0" y="0"/>
+          <a:chExt cx="0" cy="0"/>
+        </a:xfrm>
+      </p:grpSpPr>
+      <p:sp>
+        <p:nvSpPr>
+          <p:cNvPr id="2" name="Titre 1">
+            <a:extLst>
+              <a:ext uri="{FF2B5EF4-FFF2-40B4-BE49-F238E27FC236}">
+                <a16:creationId xmlns:a16="http://schemas.microsoft.com/office/drawing/2014/main" id="{265CDB99-C584-47C4-9F32-67B53E042319}"/>
+              </a:ext>
+            </a:extLst>
+          </p:cNvPr>
+          <p:cNvSpPr>
+            <a:spLocks noGrp="1"/>
+          </p:cNvSpPr>
+          <p:nvPr>
+            <p:ph type="title"/>
+          </p:nvPr>
+        </p:nvSpPr>
+        <p:spPr>
+          <a:xfrm>
+            <a:off x="609601" y="4385066"/>
+            <a:ext cx="10923638" cy="1317643"/>
+          </a:xfrm>
+        </p:spPr>
+        <p:txBody>
+          <a:bodyPr vert="horz" lIns="91440" tIns="45720" rIns="91440" bIns="45720" rtlCol="0" anchor="b">
+            <a:normAutofit/>
+          </a:bodyPr>
+          <a:lstStyle/>
+          <a:p>
+            <a:r>
+              <a:rPr lang="en-US" sz="6000" kern="1200">
+                <a:solidFill>
+                  <a:schemeClr val="tx1"/>
+                </a:solidFill>
+                <a:latin typeface="+mj-lt"/>
+                <a:ea typeface="+mj-ea"/>
+                <a:cs typeface="+mj-cs"/>
+              </a:rPr>
+              <a:t>Realtime Database Firebase</a:t>
+            </a:r>
+          </a:p>
+        </p:txBody>
+      </p:sp>
+      <p:pic>
+        <p:nvPicPr>
+          <p:cNvPr id="7" name="Image 6" descr="Une image contenant capture d’écran&#10;&#10;Description générée automatiquement">
+            <a:extLst>
+              <a:ext uri="{FF2B5EF4-FFF2-40B4-BE49-F238E27FC236}">
+                <a16:creationId xmlns:a16="http://schemas.microsoft.com/office/drawing/2014/main" id="{4D2B0F30-EF07-428B-976A-D99F4E1C498C}"/>
+              </a:ext>
+            </a:extLst>
+          </p:cNvPr>
+          <p:cNvPicPr>
+            <a:picLocks noChangeAspect="1"/>
+          </p:cNvPicPr>
+          <p:nvPr/>
+        </p:nvPicPr>
+        <p:blipFill rotWithShape="1">
+          <a:blip r:embed="rId2"/>
+          <a:srcRect l="2330" r="9512" b="2"/>
+          <a:stretch/>
+        </p:blipFill>
+        <p:spPr>
+          <a:xfrm>
+            <a:off x="20" y="10"/>
+            <a:ext cx="6095974" cy="4252522"/>
+          </a:xfrm>
+          <a:prstGeom prst="rect">
+            <a:avLst/>
+          </a:prstGeom>
+        </p:spPr>
+      </p:pic>
+      <p:pic>
+        <p:nvPicPr>
+          <p:cNvPr id="8" name="Image 7">
+            <a:extLst>
+              <a:ext uri="{FF2B5EF4-FFF2-40B4-BE49-F238E27FC236}">
+                <a16:creationId xmlns:a16="http://schemas.microsoft.com/office/drawing/2014/main" id="{32AD3FA1-E6AF-43BF-BD4C-B020D727C8A7}"/>
+              </a:ext>
+            </a:extLst>
+          </p:cNvPr>
+          <p:cNvPicPr>
+            <a:picLocks noChangeAspect="1"/>
+          </p:cNvPicPr>
+          <p:nvPr/>
+        </p:nvPicPr>
+        <p:blipFill rotWithShape="1">
+          <a:blip r:embed="rId3"/>
+          <a:srcRect r="12929"/>
+          <a:stretch/>
+        </p:blipFill>
+        <p:spPr>
+          <a:xfrm>
+            <a:off x="6095999" y="-681"/>
+            <a:ext cx="6096001" cy="4253215"/>
+          </a:xfrm>
+          <a:prstGeom prst="rect">
+            <a:avLst/>
+          </a:prstGeom>
+        </p:spPr>
+      </p:pic>
+      <p:cxnSp>
+        <p:nvCxnSpPr>
+          <p:cNvPr id="19" name="Straight Connector 18">
+            <a:extLst>
+              <a:ext uri="{FF2B5EF4-FFF2-40B4-BE49-F238E27FC236}">
+                <a16:creationId xmlns:a16="http://schemas.microsoft.com/office/drawing/2014/main" id="{EBAD6A72-88E8-42F7-88B9-CAF744536BE4}"/>
+              </a:ext>
+              <a:ext uri="{C183D7F6-B498-43B3-948B-1728B52AA6E4}">
+                <adec:decorative xmlns:adec="http://schemas.microsoft.com/office/drawing/2017/decorative" val="1"/>
+              </a:ext>
+            </a:extLst>
+          </p:cNvPr>
+          <p:cNvCxnSpPr>
+            <a:cxnSpLocks noGrp="1" noRot="1" noChangeAspect="1" noMove="1" noResize="1" noEditPoints="1" noAdjustHandles="1" noChangeArrowheads="1" noChangeShapeType="1"/>
+          </p:cNvCxnSpPr>
+          <p:nvPr>
+            <p:extLst>
+              <p:ext uri="{386F3935-93C4-4BCD-93E2-E3B085C9AB24}">
+                <p16:designElem xmlns:p16="http://schemas.microsoft.com/office/powerpoint/2015/main" val="1"/>
+              </p:ext>
+            </p:extLst>
+          </p:nvPr>
+        </p:nvCxnSpPr>
+        <p:spPr>
+          <a:xfrm>
+            <a:off x="6096000" y="-680"/>
+            <a:ext cx="0" cy="4242816"/>
+          </a:xfrm>
+          <a:prstGeom prst="line">
+            <a:avLst/>
+          </a:prstGeom>
+          <a:ln w="101600">
+            <a:solidFill>
+              <a:schemeClr val="tx1"/>
+            </a:solidFill>
+          </a:ln>
+        </p:spPr>
+        <p:style>
+          <a:lnRef idx="1">
+            <a:schemeClr val="accent1"/>
+          </a:lnRef>
+          <a:fillRef idx="0">
+            <a:schemeClr val="accent1"/>
+          </a:fillRef>
+          <a:effectRef idx="0">
+            <a:schemeClr val="accent1"/>
+          </a:effectRef>
+          <a:fontRef idx="minor">
+            <a:schemeClr val="tx1"/>
+          </a:fontRef>
+        </p:style>
+      </p:cxnSp>
+      <p:cxnSp>
+        <p:nvCxnSpPr>
+          <p:cNvPr id="21" name="Straight Connector 20">
+            <a:extLst>
+              <a:ext uri="{FF2B5EF4-FFF2-40B4-BE49-F238E27FC236}">
+                <a16:creationId xmlns:a16="http://schemas.microsoft.com/office/drawing/2014/main" id="{C800968E-0A99-46C4-A9B2-6A63AC66F4B0}"/>
+              </a:ext>
+              <a:ext uri="{C183D7F6-B498-43B3-948B-1728B52AA6E4}">
+                <adec:decorative xmlns:adec="http://schemas.microsoft.com/office/drawing/2017/decorative" val="1"/>
+              </a:ext>
+            </a:extLst>
+          </p:cNvPr>
+          <p:cNvCxnSpPr>
+            <a:cxnSpLocks noGrp="1" noRot="1" noChangeAspect="1" noMove="1" noResize="1" noEditPoints="1" noAdjustHandles="1" noChangeArrowheads="1" noChangeShapeType="1"/>
+          </p:cNvCxnSpPr>
+          <p:nvPr>
+            <p:extLst>
+              <p:ext uri="{386F3935-93C4-4BCD-93E2-E3B085C9AB24}">
+                <p16:designElem xmlns:p16="http://schemas.microsoft.com/office/powerpoint/2015/main" val="1"/>
+              </p:ext>
+            </p:extLst>
+          </p:nvPr>
+        </p:nvCxnSpPr>
+        <p:spPr>
+          <a:xfrm>
+            <a:off x="-2" y="4242136"/>
+            <a:ext cx="12192002" cy="0"/>
+          </a:xfrm>
+          <a:prstGeom prst="line">
+            <a:avLst/>
+          </a:prstGeom>
+          <a:ln w="101600">
+            <a:solidFill>
+              <a:schemeClr val="tx1"/>
+            </a:solidFill>
+          </a:ln>
+        </p:spPr>
+        <p:style>
+          <a:lnRef idx="1">
+            <a:schemeClr val="accent1"/>
+          </a:lnRef>
+          <a:fillRef idx="0">
+            <a:schemeClr val="accent1"/>
+          </a:fillRef>
+          <a:effectRef idx="0">
+            <a:schemeClr val="accent1"/>
+          </a:effectRef>
+          <a:fontRef idx="minor">
+            <a:schemeClr val="tx1"/>
+          </a:fontRef>
+        </p:style>
+      </p:cxnSp>
+    </p:spTree>
+    <p:extLst>
+      <p:ext uri="{BB962C8B-B14F-4D97-AF65-F5344CB8AC3E}">
+        <p14:creationId xmlns:p14="http://schemas.microsoft.com/office/powerpoint/2010/main" val="1890337374"/>
+      </p:ext>
+    </p:extLst>
+  </p:cSld>
+  <p:clrMapOvr>
+    <a:overrideClrMapping bg1="dk1" tx1="lt1" bg2="dk2" tx2="lt2" accent1="accent1" accent2="accent2" accent3="accent3" accent4="accent4" accent5="accent5" accent6="accent6" hlink="hlink" folHlink="folHlink"/>
+  </p:clrMapOvr>
+</p:sld>
+</file>
+
+<file path=ppt/slides/slide18.xml><?xml version="1.0" encoding="utf-8"?>
+<p:sld xmlns:a="http://schemas.openxmlformats.org/drawingml/2006/main" xmlns:r="http://schemas.openxmlformats.org/officeDocument/2006/relationships" xmlns:p="http://schemas.openxmlformats.org/presentationml/2006/main">
+  <p:cSld>
+    <p:bg>
+      <p:bgPr>
+        <a:solidFill>
+          <a:schemeClr val="bg1"/>
+        </a:solidFill>
+        <a:effectLst/>
+      </p:bgPr>
+    </p:bg>
+    <p:spTree>
+      <p:nvGrpSpPr>
+        <p:cNvPr id="1" name=""/>
+        <p:cNvGrpSpPr/>
+        <p:nvPr/>
+      </p:nvGrpSpPr>
+      <p:grpSpPr>
+        <a:xfrm>
+          <a:off x="0" y="0"/>
+          <a:ext cx="0" cy="0"/>
+          <a:chOff x="0" y="0"/>
+          <a:chExt cx="0" cy="0"/>
+        </a:xfrm>
+      </p:grpSpPr>
+      <p:sp>
+        <p:nvSpPr>
+          <p:cNvPr id="10" name="Rectangle 9">
+            <a:extLst>
+              <a:ext uri="{FF2B5EF4-FFF2-40B4-BE49-F238E27FC236}">
+                <a16:creationId xmlns:a16="http://schemas.microsoft.com/office/drawing/2014/main" id="{823AC064-BC96-4F32-8AE1-B2FD38754823}"/>
+              </a:ext>
+              <a:ext uri="{C183D7F6-B498-43B3-948B-1728B52AA6E4}">
+                <adec:decorative xmlns:adec="http://schemas.microsoft.com/office/drawing/2017/decorative" val="1"/>
+              </a:ext>
+            </a:extLst>
+          </p:cNvPr>
+          <p:cNvSpPr>
+            <a:spLocks noGrp="1" noRot="1" noChangeAspect="1" noMove="1" noResize="1" noEditPoints="1" noAdjustHandles="1" noChangeArrowheads="1" noChangeShapeType="1" noTextEdit="1"/>
+          </p:cNvSpPr>
+          <p:nvPr>
+            <p:extLst>
+              <p:ext uri="{386F3935-93C4-4BCD-93E2-E3B085C9AB24}">
+                <p16:designElem xmlns:p16="http://schemas.microsoft.com/office/powerpoint/2015/main" val="1"/>
+              </p:ext>
+            </p:extLst>
+          </p:nvPr>
+        </p:nvSpPr>
+        <p:spPr bwMode="ltGray">
+          <a:xfrm>
+            <a:off x="396882" y="280374"/>
+            <a:ext cx="11438793" cy="1844256"/>
+          </a:xfrm>
+          <a:prstGeom prst="rect">
+            <a:avLst/>
+          </a:prstGeom>
+          <a:solidFill>
+            <a:srgbClr val="404040"/>
+          </a:solidFill>
+          <a:ln w="127000" cap="sq" cmpd="thinThick">
+            <a:solidFill>
+              <a:srgbClr val="404040"/>
+            </a:solidFill>
+          </a:ln>
+        </p:spPr>
+        <p:style>
+          <a:lnRef idx="2">
+            <a:schemeClr val="accent1">
+              <a:shade val="50000"/>
+            </a:schemeClr>
+          </a:lnRef>
+          <a:fillRef idx="1">
+            <a:schemeClr val="accent1"/>
+          </a:fillRef>
+          <a:effectRef idx="0">
+            <a:schemeClr val="accent1"/>
+          </a:effectRef>
+          <a:fontRef idx="minor">
+            <a:schemeClr val="lt1"/>
+          </a:fontRef>
+        </p:style>
+        <p:txBody>
+          <a:bodyPr rtlCol="0" anchor="ctr"/>
+          <a:lstStyle/>
+          <a:p>
+            <a:pPr algn="ctr"/>
+            <a:endParaRPr lang="en-US"/>
+          </a:p>
+        </p:txBody>
+      </p:sp>
+      <p:sp>
+        <p:nvSpPr>
+          <p:cNvPr id="2" name="Titre 1">
+            <a:extLst>
+              <a:ext uri="{FF2B5EF4-FFF2-40B4-BE49-F238E27FC236}">
+                <a16:creationId xmlns:a16="http://schemas.microsoft.com/office/drawing/2014/main" id="{C5145B32-8244-4CD9-9079-A9860BA79E92}"/>
+              </a:ext>
+            </a:extLst>
+          </p:cNvPr>
+          <p:cNvSpPr>
+            <a:spLocks noGrp="1"/>
+          </p:cNvSpPr>
+          <p:nvPr>
+            <p:ph type="title"/>
+          </p:nvPr>
+        </p:nvSpPr>
+        <p:spPr>
+          <a:xfrm>
+            <a:off x="546351" y="433545"/>
+            <a:ext cx="11139854" cy="930447"/>
+          </a:xfrm>
+        </p:spPr>
+        <p:txBody>
+          <a:bodyPr vert="horz" lIns="91440" tIns="45720" rIns="91440" bIns="45720" rtlCol="0" anchor="b">
+            <a:normAutofit/>
+          </a:bodyPr>
+          <a:lstStyle/>
+          <a:p>
+            <a:pPr algn="ctr"/>
+            <a:r>
+              <a:rPr lang="en-US" sz="5400">
+                <a:solidFill>
+                  <a:srgbClr val="FFFFFF"/>
+                </a:solidFill>
+              </a:rPr>
+              <a:t>Maintenabilité</a:t>
+            </a:r>
+          </a:p>
+        </p:txBody>
+      </p:sp>
+      <p:cxnSp>
+        <p:nvCxnSpPr>
+          <p:cNvPr id="12" name="Straight Connector 11">
+            <a:extLst>
+              <a:ext uri="{FF2B5EF4-FFF2-40B4-BE49-F238E27FC236}">
+                <a16:creationId xmlns:a16="http://schemas.microsoft.com/office/drawing/2014/main" id="{7E7C77BC-7138-40B1-A15B-20F57A494629}"/>
+              </a:ext>
+              <a:ext uri="{C183D7F6-B498-43B3-948B-1728B52AA6E4}">
+                <adec:decorative xmlns:adec="http://schemas.microsoft.com/office/drawing/2017/decorative" val="1"/>
+              </a:ext>
+            </a:extLst>
+          </p:cNvPr>
+          <p:cNvCxnSpPr>
+            <a:cxnSpLocks noGrp="1" noRot="1" noChangeAspect="1" noMove="1" noResize="1" noEditPoints="1" noAdjustHandles="1" noChangeArrowheads="1" noChangeShapeType="1"/>
+          </p:cNvCxnSpPr>
+          <p:nvPr>
+            <p:extLst>
+              <p:ext uri="{386F3935-93C4-4BCD-93E2-E3B085C9AB24}">
+                <p16:designElem xmlns:p16="http://schemas.microsoft.com/office/powerpoint/2015/main" val="1"/>
+              </p:ext>
+            </p:extLst>
+          </p:nvPr>
+        </p:nvCxnSpPr>
+        <p:spPr>
+          <a:xfrm>
+            <a:off x="2230078" y="1522292"/>
+            <a:ext cx="7772400" cy="0"/>
+          </a:xfrm>
+          <a:prstGeom prst="line">
+            <a:avLst/>
+          </a:prstGeom>
+          <a:ln w="22225">
+            <a:solidFill>
+              <a:srgbClr val="D9D9D9"/>
+            </a:solidFill>
+          </a:ln>
+        </p:spPr>
+        <p:style>
+          <a:lnRef idx="1">
+            <a:schemeClr val="accent1"/>
+          </a:lnRef>
+          <a:fillRef idx="0">
+            <a:schemeClr val="accent1"/>
+          </a:fillRef>
+          <a:effectRef idx="0">
+            <a:schemeClr val="accent1"/>
+          </a:effectRef>
+          <a:fontRef idx="minor">
+            <a:schemeClr val="tx1"/>
+          </a:fontRef>
+        </p:style>
+      </p:cxnSp>
+      <p:pic>
+        <p:nvPicPr>
+          <p:cNvPr id="4" name="Image 3">
+            <a:extLst>
+              <a:ext uri="{FF2B5EF4-FFF2-40B4-BE49-F238E27FC236}">
+                <a16:creationId xmlns:a16="http://schemas.microsoft.com/office/drawing/2014/main" id="{AC692B96-02B1-4578-874F-20E45E104ECD}"/>
+              </a:ext>
+            </a:extLst>
+          </p:cNvPr>
+          <p:cNvPicPr>
+            <a:picLocks noChangeAspect="1"/>
+          </p:cNvPicPr>
+          <p:nvPr/>
+        </p:nvPicPr>
+        <p:blipFill>
+          <a:blip r:embed="rId2"/>
+          <a:stretch>
+            <a:fillRect/>
+          </a:stretch>
+        </p:blipFill>
+        <p:spPr>
+          <a:xfrm>
+            <a:off x="2179005" y="2426818"/>
+            <a:ext cx="1761040" cy="3997637"/>
+          </a:xfrm>
+          <a:prstGeom prst="rect">
+            <a:avLst/>
+          </a:prstGeom>
+        </p:spPr>
+      </p:pic>
+      <p:cxnSp>
+        <p:nvCxnSpPr>
+          <p:cNvPr id="14" name="Straight Connector 13">
+            <a:extLst>
+              <a:ext uri="{FF2B5EF4-FFF2-40B4-BE49-F238E27FC236}">
+                <a16:creationId xmlns:a16="http://schemas.microsoft.com/office/drawing/2014/main" id="{DB146403-F3D6-484B-B2ED-97F9565D0370}"/>
+              </a:ext>
+              <a:ext uri="{C183D7F6-B498-43B3-948B-1728B52AA6E4}">
+                <adec:decorative xmlns:adec="http://schemas.microsoft.com/office/drawing/2017/decorative" val="1"/>
+              </a:ext>
+            </a:extLst>
+          </p:cNvPr>
+          <p:cNvCxnSpPr>
+            <a:cxnSpLocks noGrp="1" noRot="1" noChangeAspect="1" noMove="1" noResize="1" noEditPoints="1" noAdjustHandles="1" noChangeArrowheads="1" noChangeShapeType="1"/>
+          </p:cNvCxnSpPr>
+          <p:nvPr>
+            <p:extLst>
+              <p:ext uri="{386F3935-93C4-4BCD-93E2-E3B085C9AB24}">
+                <p16:designElem xmlns:p16="http://schemas.microsoft.com/office/powerpoint/2015/main" val="1"/>
+              </p:ext>
+            </p:extLst>
+          </p:nvPr>
+        </p:nvCxnSpPr>
+        <p:spPr>
+          <a:xfrm>
+            <a:off x="6116278" y="2596836"/>
+            <a:ext cx="0" cy="3657600"/>
+          </a:xfrm>
+          <a:prstGeom prst="line">
+            <a:avLst/>
+          </a:prstGeom>
+          <a:ln w="101600" cmpd="dbl">
+            <a:solidFill>
+              <a:srgbClr val="595959"/>
+            </a:solidFill>
+          </a:ln>
+        </p:spPr>
+        <p:style>
+          <a:lnRef idx="1">
+            <a:schemeClr val="accent1"/>
+          </a:lnRef>
+          <a:fillRef idx="0">
+            <a:schemeClr val="accent1"/>
+          </a:fillRef>
+          <a:effectRef idx="0">
+            <a:schemeClr val="accent1"/>
+          </a:effectRef>
+          <a:fontRef idx="minor">
+            <a:schemeClr val="tx1"/>
+          </a:fontRef>
+        </p:style>
+      </p:cxnSp>
+      <p:pic>
+        <p:nvPicPr>
+          <p:cNvPr id="5" name="Image 4">
+            <a:extLst>
+              <a:ext uri="{FF2B5EF4-FFF2-40B4-BE49-F238E27FC236}">
+                <a16:creationId xmlns:a16="http://schemas.microsoft.com/office/drawing/2014/main" id="{7724BA1B-08AB-4975-9981-EAEBCD3F4E63}"/>
+              </a:ext>
+            </a:extLst>
+          </p:cNvPr>
+          <p:cNvPicPr>
+            <a:picLocks noChangeAspect="1"/>
+          </p:cNvPicPr>
+          <p:nvPr/>
+        </p:nvPicPr>
+        <p:blipFill>
+          <a:blip r:embed="rId3"/>
+          <a:stretch>
+            <a:fillRect/>
+          </a:stretch>
+        </p:blipFill>
+        <p:spPr>
+          <a:xfrm>
+            <a:off x="6855561" y="2426818"/>
+            <a:ext cx="4634941" cy="3997637"/>
+          </a:xfrm>
+          <a:prstGeom prst="rect">
+            <a:avLst/>
+          </a:prstGeom>
+        </p:spPr>
+      </p:pic>
+    </p:spTree>
+    <p:extLst>
+      <p:ext uri="{BB962C8B-B14F-4D97-AF65-F5344CB8AC3E}">
+        <p14:creationId xmlns:p14="http://schemas.microsoft.com/office/powerpoint/2010/main" val="3292488257"/>
+      </p:ext>
+    </p:extLst>
+  </p:cSld>
+  <p:clrMapOvr>
+    <a:masterClrMapping/>
+  </p:clrMapOvr>
+</p:sld>
+</file>
+
+<file path=ppt/slides/slide2.xml><?xml version="1.0" encoding="utf-8"?>
+<p:sld xmlns:a="http://schemas.openxmlformats.org/drawingml/2006/main" xmlns:r="http://schemas.openxmlformats.org/officeDocument/2006/relationships" xmlns:p="http://schemas.openxmlformats.org/presentationml/2006/main">
+  <p:cSld>
     <p:spTree>
       <p:nvGrpSpPr>
         <p:cNvPr id="1" name=""/>
@@ -4635,7 +7218,7 @@
       </p:grpSpPr>
       <p:sp>
         <p:nvSpPr>
-          <p:cNvPr id="10" name="Rectangle 9">
+          <p:cNvPr id="17" name="Rectangle 16">
             <a:extLst>
               <a:ext uri="{FF2B5EF4-FFF2-40B4-BE49-F238E27FC236}">
                 <a16:creationId xmlns:a16="http://schemas.microsoft.com/office/drawing/2014/main" id="{823AC064-BC96-4F32-8AE1-B2FD38754823}"/>
@@ -4658,7 +7241,7 @@
         </p:nvSpPr>
         <p:spPr bwMode="ltGray">
           <a:xfrm>
-            <a:off x="378068" y="343486"/>
+            <a:off x="378068" y="4633546"/>
             <a:ext cx="11438793" cy="1844256"/>
           </a:xfrm>
           <a:prstGeom prst="rect">
@@ -4745,7 +7328,7 @@
         </p:nvSpPr>
         <p:spPr>
           <a:xfrm>
-            <a:off x="526073" y="466578"/>
+            <a:off x="526073" y="4756638"/>
             <a:ext cx="11139854" cy="930447"/>
           </a:xfrm>
         </p:spPr>
@@ -4757,7 +7340,7 @@
           <a:p>
             <a:pPr algn="ctr"/>
             <a:r>
-              <a:rPr lang="en-US" sz="5400" kern="1200">
+              <a:rPr lang="en-US" sz="5400" kern="1200" dirty="0" err="1">
                 <a:solidFill>
                   <a:srgbClr val="FFFFFF"/>
                 </a:solidFill>
@@ -4765,14 +7348,101 @@
                 <a:ea typeface="+mj-ea"/>
                 <a:cs typeface="+mj-cs"/>
               </a:rPr>
-              <a:t>Parcours Youtube: Création des playlists</a:t>
+              <a:t>Parcours</a:t>
             </a:r>
-          </a:p>
-        </p:txBody>
-      </p:sp>
+            <a:r>
+              <a:rPr lang="en-US" sz="5400" kern="1200" dirty="0">
+                <a:solidFill>
+                  <a:srgbClr val="FFFFFF"/>
+                </a:solidFill>
+                <a:latin typeface="+mj-lt"/>
+                <a:ea typeface="+mj-ea"/>
+                <a:cs typeface="+mj-cs"/>
+              </a:rPr>
+              <a:t> </a:t>
+            </a:r>
+            <a:r>
+              <a:rPr lang="en-US" sz="5400" kern="1200" dirty="0" err="1">
+                <a:solidFill>
+                  <a:srgbClr val="FFFFFF"/>
+                </a:solidFill>
+                <a:latin typeface="+mj-lt"/>
+                <a:ea typeface="+mj-ea"/>
+                <a:cs typeface="+mj-cs"/>
+              </a:rPr>
+              <a:t>Youtube</a:t>
+            </a:r>
+            <a:r>
+              <a:rPr lang="en-US" sz="5400" kern="1200" dirty="0">
+                <a:solidFill>
+                  <a:srgbClr val="FFFFFF"/>
+                </a:solidFill>
+                <a:latin typeface="+mj-lt"/>
+                <a:ea typeface="+mj-ea"/>
+                <a:cs typeface="+mj-cs"/>
+              </a:rPr>
+              <a:t>: </a:t>
+            </a:r>
+            <a:r>
+              <a:rPr lang="en-US" sz="5400" kern="1200" dirty="0" err="1">
+                <a:solidFill>
+                  <a:srgbClr val="FFFFFF"/>
+                </a:solidFill>
+                <a:latin typeface="+mj-lt"/>
+                <a:ea typeface="+mj-ea"/>
+                <a:cs typeface="+mj-cs"/>
+              </a:rPr>
+              <a:t>Création</a:t>
+            </a:r>
+            <a:r>
+              <a:rPr lang="en-US" sz="5400" kern="1200" dirty="0">
+                <a:solidFill>
+                  <a:srgbClr val="FFFFFF"/>
+                </a:solidFill>
+                <a:latin typeface="+mj-lt"/>
+                <a:ea typeface="+mj-ea"/>
+                <a:cs typeface="+mj-cs"/>
+              </a:rPr>
+              <a:t> des playlists</a:t>
+            </a:r>
+          </a:p>
+        </p:txBody>
+      </p:sp>
+      <p:pic>
+        <p:nvPicPr>
+          <p:cNvPr id="5" name="Espace réservé du contenu 4" descr="Une image contenant texte&#10;&#10;Description générée automatiquement">
+            <a:extLst>
+              <a:ext uri="{FF2B5EF4-FFF2-40B4-BE49-F238E27FC236}">
+                <a16:creationId xmlns:a16="http://schemas.microsoft.com/office/drawing/2014/main" id="{C44A4FDC-B81D-0E47-A7CA-5F02189E07B3}"/>
+              </a:ext>
+            </a:extLst>
+          </p:cNvPr>
+          <p:cNvPicPr>
+            <a:picLocks noGrp="1" noChangeAspect="1"/>
+          </p:cNvPicPr>
+          <p:nvPr>
+            <p:ph idx="1"/>
+          </p:nvPr>
+        </p:nvPicPr>
+        <p:blipFill>
+          <a:blip r:embed="rId2"/>
+          <a:stretch>
+            <a:fillRect/>
+          </a:stretch>
+        </p:blipFill>
+        <p:spPr>
+          <a:xfrm>
+            <a:off x="3233247" y="307731"/>
+            <a:ext cx="5670407" cy="3997637"/>
+          </a:xfrm>
+          <a:prstGeom prst="rect">
+            <a:avLst/>
+          </a:prstGeom>
+        </p:spPr>
+      </p:pic>
       <p:cxnSp>
         <p:nvCxnSpPr>
-          <p:cNvPr id="12" name="Straight Connector 11">
+          <p:cNvPr id="19" name="Straight Connector 18">
             <a:extLst>
               <a:ext uri="{FF2B5EF4-FFF2-40B4-BE49-F238E27FC236}">
                 <a16:creationId xmlns:a16="http://schemas.microsoft.com/office/drawing/2014/main" id="{7E7C77BC-7138-40B1-A15B-20F57A494629}"/>
@@ -4795,7 +7465,7 @@
         </p:nvCxnSpPr>
         <p:spPr>
           <a:xfrm>
-            <a:off x="2209800" y="1448631"/>
+            <a:off x="2209800" y="5738691"/>
             <a:ext cx="7772400" cy="0"/>
           </a:xfrm>
           <a:prstGeom prst="line">
@@ -4822,38 +7492,6 @@
           </a:fontRef>
         </p:style>
       </p:cxnSp>
-      <p:pic>
-        <p:nvPicPr>
-          <p:cNvPr id="5" name="Espace réservé du contenu 4" descr="Une image contenant texte&#10;&#10;Description générée automatiquement">
-            <a:extLst>
-              <a:ext uri="{FF2B5EF4-FFF2-40B4-BE49-F238E27FC236}">
-                <a16:creationId xmlns:a16="http://schemas.microsoft.com/office/drawing/2014/main" id="{C44A4FDC-B81D-0E47-A7CA-5F02189E07B3}"/>
-              </a:ext>
-            </a:extLst>
-          </p:cNvPr>
-          <p:cNvPicPr>
-            <a:picLocks noGrp="1" noChangeAspect="1"/>
-          </p:cNvPicPr>
-          <p:nvPr>
-            <p:ph idx="1"/>
-          </p:nvPr>
-        </p:nvPicPr>
-        <p:blipFill>
-          <a:blip r:embed="rId2"/>
-          <a:stretch>
-            <a:fillRect/>
-          </a:stretch>
-        </p:blipFill>
-        <p:spPr>
-          <a:xfrm>
-            <a:off x="3233247" y="2509911"/>
-            <a:ext cx="5670407" cy="3997637"/>
-          </a:xfrm>
-          <a:prstGeom prst="rect">
-            <a:avLst/>
-          </a:prstGeom>
-        </p:spPr>
-      </p:pic>
     </p:spTree>
     <p:extLst>
       <p:ext uri="{BB962C8B-B14F-4D97-AF65-F5344CB8AC3E}">
@@ -5016,7 +7654,7 @@
           <a:p>
             <a:pPr algn="ctr"/>
             <a:r>
-              <a:rPr lang="en-US" sz="4600" kern="1200" dirty="0" err="1">
+              <a:rPr lang="en-US" sz="4600" kern="1200">
                 <a:solidFill>
                   <a:srgbClr val="FFFFFF"/>
                 </a:solidFill>
@@ -5038,7 +7676,7 @@
               <a:t> </a:t>
             </a:r>
             <a:r>
-              <a:rPr lang="en-US" sz="4600" kern="1200" dirty="0" err="1">
+              <a:rPr lang="en-US" sz="4600" kern="1200">
                 <a:solidFill>
                   <a:srgbClr val="FFFFFF"/>
                 </a:solidFill>
@@ -5346,7 +7984,7 @@
           <a:p>
             <a:pPr algn="ctr"/>
             <a:r>
-              <a:rPr lang="en-US" sz="5800" kern="1200" dirty="0" err="1">
+              <a:rPr lang="en-US" sz="5800" kern="1200">
                 <a:solidFill>
                   <a:schemeClr val="tx1"/>
                 </a:solidFill>
@@ -5368,7 +8006,7 @@
               <a:t> </a:t>
             </a:r>
             <a:r>
-              <a:rPr lang="en-US" sz="5800" kern="1200" dirty="0" err="1">
+              <a:rPr lang="en-US" sz="5800" kern="1200">
                 <a:solidFill>
                   <a:schemeClr val="tx1"/>
                 </a:solidFill>
@@ -5525,14 +8163,6 @@
 <file path=ppt/slides/slide7.xml><?xml version="1.0" encoding="utf-8"?>
 <p:sld xmlns:a="http://schemas.openxmlformats.org/drawingml/2006/main" xmlns:r="http://schemas.openxmlformats.org/officeDocument/2006/relationships" xmlns:p="http://schemas.openxmlformats.org/presentationml/2006/main">
   <p:cSld>
-    <p:bg>
-      <p:bgPr>
-        <a:solidFill>
-          <a:schemeClr val="bg1"/>
-        </a:solidFill>
-        <a:effectLst/>
-      </p:bgPr>
-    </p:bg>
     <p:spTree>
       <p:nvGrpSpPr>
         <p:cNvPr id="1" name=""/>
@@ -5778,7 +8408,7 @@
           <a:p>
             <a:pPr algn="ctr"/>
             <a:r>
-              <a:rPr lang="en-US" sz="5800" kern="1200" dirty="0" err="1">
+              <a:rPr lang="en-US" sz="5800" kern="1200">
                 <a:solidFill>
                   <a:schemeClr val="tx1"/>
                 </a:solidFill>
@@ -5959,7 +8589,7 @@
       </p:grpSpPr>
       <p:sp>
         <p:nvSpPr>
-          <p:cNvPr id="12" name="Rectangle 11">
+          <p:cNvPr id="18" name="Rectangle 17">
             <a:extLst>
               <a:ext uri="{FF2B5EF4-FFF2-40B4-BE49-F238E27FC236}">
                 <a16:creationId xmlns:a16="http://schemas.microsoft.com/office/drawing/2014/main" id="{823AC064-BC96-4F32-8AE1-B2FD38754823}"/>
@@ -5982,7 +8612,7 @@
         </p:nvSpPr>
         <p:spPr bwMode="ltGray">
           <a:xfrm>
-            <a:off x="378068" y="343486"/>
+            <a:off x="396882" y="280374"/>
             <a:ext cx="11438793" cy="1844256"/>
           </a:xfrm>
           <a:prstGeom prst="rect">
@@ -6017,37 +8647,8 @@
           <a:bodyPr rtlCol="0" anchor="ctr"/>
           <a:lstStyle/>
           <a:p>
-            <a:pPr marL="0" marR="0" lvl="0" indent="0" algn="ctr" defTabSz="914400" rtl="0" eaLnBrk="1" fontAlgn="auto" latinLnBrk="0" hangingPunct="1">
-              <a:lnSpc>
-                <a:spcPct val="100000"/>
-              </a:lnSpc>
-              <a:spcBef>
-                <a:spcPts val="0"/>
-              </a:spcBef>
-              <a:spcAft>
-                <a:spcPts val="0"/>
-              </a:spcAft>
-              <a:buClrTx/>
-              <a:buSzTx/>
-              <a:buFontTx/>
-              <a:buNone/>
-              <a:tabLst/>
-              <a:defRPr/>
-            </a:pPr>
-            <a:endParaRPr kumimoji="0" lang="en-US" sz="1800" b="0" i="0" u="none" strike="noStrike" kern="1200" cap="none" spc="0" normalizeH="0" baseline="0" noProof="0">
-              <a:ln>
-                <a:noFill/>
-              </a:ln>
-              <a:solidFill>
-                <a:prstClr val="white"/>
-              </a:solidFill>
-              <a:effectLst/>
-              <a:uLnTx/>
-              <a:uFillTx/>
-              <a:latin typeface="Calibri" panose="020F0502020204030204"/>
-              <a:ea typeface="+mn-ea"/>
-              <a:cs typeface="+mn-cs"/>
-            </a:endParaRPr>
+            <a:pPr algn="ctr"/>
+            <a:endParaRPr lang="en-US"/>
           </a:p>
         </p:txBody>
       </p:sp>
@@ -6069,7 +8670,7 @@
         </p:nvSpPr>
         <p:spPr>
           <a:xfrm>
-            <a:off x="526073" y="466578"/>
+            <a:off x="546351" y="433545"/>
             <a:ext cx="11139854" cy="930447"/>
           </a:xfrm>
         </p:spPr>
@@ -6081,27 +8682,19 @@
           <a:p>
             <a:pPr algn="ctr"/>
             <a:r>
-              <a:rPr lang="en-US" sz="4600" dirty="0">
+              <a:rPr lang="en-US" sz="5400" dirty="0">
                 <a:solidFill>
                   <a:srgbClr val="FFFFFF"/>
                 </a:solidFill>
               </a:rPr>
               <a:t>Refactoring: Packages</a:t>
             </a:r>
-            <a:endParaRPr lang="en-US" sz="4600" kern="1200" dirty="0">
-              <a:solidFill>
-                <a:srgbClr val="FFFFFF"/>
-              </a:solidFill>
-              <a:latin typeface="+mj-lt"/>
-              <a:ea typeface="+mj-ea"/>
-              <a:cs typeface="+mj-cs"/>
-            </a:endParaRPr>
           </a:p>
         </p:txBody>
       </p:sp>
       <p:cxnSp>
         <p:nvCxnSpPr>
-          <p:cNvPr id="14" name="Straight Connector 13">
+          <p:cNvPr id="20" name="Straight Connector 19">
             <a:extLst>
               <a:ext uri="{FF2B5EF4-FFF2-40B4-BE49-F238E27FC236}">
                 <a16:creationId xmlns:a16="http://schemas.microsoft.com/office/drawing/2014/main" id="{7E7C77BC-7138-40B1-A15B-20F57A494629}"/>
@@ -6124,7 +8717,7 @@
         </p:nvCxnSpPr>
         <p:spPr>
           <a:xfrm>
-            <a:off x="2209800" y="1448631"/>
+            <a:off x="2230078" y="1522292"/>
             <a:ext cx="7772400" cy="0"/>
           </a:xfrm>
           <a:prstGeom prst="line">
@@ -6151,21 +8744,71 @@
           </a:fontRef>
         </p:style>
       </p:cxnSp>
+      <p:cxnSp>
+        <p:nvCxnSpPr>
+          <p:cNvPr id="22" name="Straight Connector 21">
+            <a:extLst>
+              <a:ext uri="{FF2B5EF4-FFF2-40B4-BE49-F238E27FC236}">
+                <a16:creationId xmlns:a16="http://schemas.microsoft.com/office/drawing/2014/main" id="{DB146403-F3D6-484B-B2ED-97F9565D0370}"/>
+              </a:ext>
+              <a:ext uri="{C183D7F6-B498-43B3-948B-1728B52AA6E4}">
+                <adec:decorative xmlns:adec="http://schemas.microsoft.com/office/drawing/2017/decorative" val="1"/>
+              </a:ext>
+            </a:extLst>
+          </p:cNvPr>
+          <p:cNvCxnSpPr>
+            <a:cxnSpLocks noGrp="1" noRot="1" noChangeAspect="1" noMove="1" noResize="1" noEditPoints="1" noAdjustHandles="1" noChangeArrowheads="1" noChangeShapeType="1"/>
+          </p:cNvCxnSpPr>
+          <p:nvPr>
+            <p:extLst>
+              <p:ext uri="{386F3935-93C4-4BCD-93E2-E3B085C9AB24}">
+                <p16:designElem xmlns:p16="http://schemas.microsoft.com/office/powerpoint/2015/main" val="1"/>
+              </p:ext>
+            </p:extLst>
+          </p:nvPr>
+        </p:nvCxnSpPr>
+        <p:spPr>
+          <a:xfrm>
+            <a:off x="6116278" y="2596836"/>
+            <a:ext cx="0" cy="3657600"/>
+          </a:xfrm>
+          <a:prstGeom prst="line">
+            <a:avLst/>
+          </a:prstGeom>
+          <a:ln w="101600" cmpd="dbl">
+            <a:solidFill>
+              <a:srgbClr val="595959"/>
+            </a:solidFill>
+          </a:ln>
+        </p:spPr>
+        <p:style>
+          <a:lnRef idx="1">
+            <a:schemeClr val="accent1"/>
+          </a:lnRef>
+          <a:fillRef idx="0">
+            <a:schemeClr val="accent1"/>
+          </a:fillRef>
+          <a:effectRef idx="0">
+            <a:schemeClr val="accent1"/>
+          </a:effectRef>
+          <a:fontRef idx="minor">
+            <a:schemeClr val="tx1"/>
+          </a:fontRef>
+        </p:style>
+      </p:cxnSp>
       <p:pic>
         <p:nvPicPr>
-          <p:cNvPr id="6" name="Espace réservé du contenu 4" descr="Une image contenant capture d’écran&#10;&#10;Description générée automatiquement">
-            <a:extLst>
-              <a:ext uri="{FF2B5EF4-FFF2-40B4-BE49-F238E27FC236}">
-                <a16:creationId xmlns:a16="http://schemas.microsoft.com/office/drawing/2014/main" id="{DD40127F-38C1-A54F-8AB9-38DA22C755DC}"/>
+          <p:cNvPr id="8" name="Image 7" descr="Une image contenant capture d’écran, texte&#10;&#10;Description générée automatiquement">
+            <a:extLst>
+              <a:ext uri="{FF2B5EF4-FFF2-40B4-BE49-F238E27FC236}">
+                <a16:creationId xmlns:a16="http://schemas.microsoft.com/office/drawing/2014/main" id="{63D07DA9-DB2D-4F0E-9C11-A8D93A8F20E1}"/>
               </a:ext>
             </a:extLst>
           </p:cNvPr>
           <p:cNvPicPr>
-            <a:picLocks noGrp="1" noChangeAspect="1"/>
+            <a:picLocks noChangeAspect="1"/>
           </p:cNvPicPr>
-          <p:nvPr>
-            <p:ph idx="1"/>
-          </p:nvPr>
+          <p:nvPr/>
         </p:nvPicPr>
         <p:blipFill>
           <a:blip r:embed="rId2"/>
@@ -6175,17 +8818,20 @@
         </p:blipFill>
         <p:spPr>
           <a:xfrm>
-            <a:off x="6649452" y="4898054"/>
-            <a:ext cx="4154905" cy="1729339"/>
-          </a:xfrm>
+            <a:off x="1909013" y="2495598"/>
+            <a:ext cx="3503596" cy="2942676"/>
+          </a:xfrm>
+          <a:prstGeom prst="rect">
+            <a:avLst/>
+          </a:prstGeom>
         </p:spPr>
       </p:pic>
       <p:pic>
         <p:nvPicPr>
-          <p:cNvPr id="8" name="Image 7" descr="Une image contenant capture d’écran&#10;&#10;Description générée automatiquement">
-            <a:extLst>
-              <a:ext uri="{FF2B5EF4-FFF2-40B4-BE49-F238E27FC236}">
-                <a16:creationId xmlns:a16="http://schemas.microsoft.com/office/drawing/2014/main" id="{3DF9A442-C623-AB44-8F0D-B8917D495188}"/>
+          <p:cNvPr id="9" name="Image 8">
+            <a:extLst>
+              <a:ext uri="{FF2B5EF4-FFF2-40B4-BE49-F238E27FC236}">
+                <a16:creationId xmlns:a16="http://schemas.microsoft.com/office/drawing/2014/main" id="{32DBE736-61BB-4B0C-98F1-5F90988EAB33}"/>
               </a:ext>
             </a:extLst>
           </p:cNvPr>
@@ -6202,8 +8848,8 @@
         </p:blipFill>
         <p:spPr>
           <a:xfrm>
-            <a:off x="6649454" y="2571707"/>
-            <a:ext cx="4154905" cy="2053845"/>
+            <a:off x="1909013" y="5691470"/>
+            <a:ext cx="3503596" cy="1055571"/>
           </a:xfrm>
           <a:prstGeom prst="rect">
             <a:avLst/>
@@ -6212,10 +8858,10 @@
       </p:pic>
       <p:pic>
         <p:nvPicPr>
-          <p:cNvPr id="9" name="Image 8">
-            <a:extLst>
-              <a:ext uri="{FF2B5EF4-FFF2-40B4-BE49-F238E27FC236}">
-                <a16:creationId xmlns:a16="http://schemas.microsoft.com/office/drawing/2014/main" id="{CDD3A6AA-02A1-F74B-AEC3-2EE143316F38}"/>
+          <p:cNvPr id="10" name="Image 9" descr="Une image contenant capture d’écran&#10;&#10;Description générée automatiquement">
+            <a:extLst>
+              <a:ext uri="{FF2B5EF4-FFF2-40B4-BE49-F238E27FC236}">
+                <a16:creationId xmlns:a16="http://schemas.microsoft.com/office/drawing/2014/main" id="{808347C3-30D4-4363-8A7B-162A6D297549}"/>
               </a:ext>
             </a:extLst>
           </p:cNvPr>
@@ -6232,8 +8878,8 @@
         </p:blipFill>
         <p:spPr>
           <a:xfrm>
-            <a:off x="1909013" y="5691470"/>
-            <a:ext cx="3503596" cy="1055571"/>
+            <a:off x="6649454" y="2571707"/>
+            <a:ext cx="4154905" cy="2053845"/>
           </a:xfrm>
           <a:prstGeom prst="rect">
             <a:avLst/>
@@ -6242,17 +8888,19 @@
       </p:pic>
       <p:pic>
         <p:nvPicPr>
-          <p:cNvPr id="10" name="Image 9" descr="Une image contenant capture d’écran, texte&#10;&#10;Description générée automatiquement">
-            <a:extLst>
-              <a:ext uri="{FF2B5EF4-FFF2-40B4-BE49-F238E27FC236}">
-                <a16:creationId xmlns:a16="http://schemas.microsoft.com/office/drawing/2014/main" id="{2E8F8219-11AB-3B41-9DED-2749B7F6C284}"/>
+          <p:cNvPr id="12" name="Espace réservé du contenu 4" descr="Une image contenant capture d’écran&#10;&#10;Description générée automatiquement">
+            <a:extLst>
+              <a:ext uri="{FF2B5EF4-FFF2-40B4-BE49-F238E27FC236}">
+                <a16:creationId xmlns:a16="http://schemas.microsoft.com/office/drawing/2014/main" id="{78629887-BFBF-41AC-9507-D278ED358713}"/>
               </a:ext>
             </a:extLst>
           </p:cNvPr>
           <p:cNvPicPr>
-            <a:picLocks noChangeAspect="1"/>
+            <a:picLocks noGrp="1" noChangeAspect="1"/>
           </p:cNvPicPr>
-          <p:nvPr/>
+          <p:nvPr>
+            <p:ph idx="1"/>
+          </p:nvPr>
         </p:nvPicPr>
         <p:blipFill>
           <a:blip r:embed="rId5"/>
@@ -6262,18 +8910,15 @@
         </p:blipFill>
         <p:spPr>
           <a:xfrm>
-            <a:off x="1909013" y="2495598"/>
-            <a:ext cx="3503596" cy="2942676"/>
-          </a:xfrm>
-          <a:prstGeom prst="rect">
-            <a:avLst/>
-          </a:prstGeom>
+            <a:off x="6649452" y="4898054"/>
+            <a:ext cx="4154905" cy="1729339"/>
+          </a:xfrm>
         </p:spPr>
       </p:pic>
     </p:spTree>
     <p:extLst>
       <p:ext uri="{BB962C8B-B14F-4D97-AF65-F5344CB8AC3E}">
-        <p14:creationId xmlns:p14="http://schemas.microsoft.com/office/powerpoint/2010/main" val="1575374077"/>
+        <p14:creationId xmlns:p14="http://schemas.microsoft.com/office/powerpoint/2010/main" val="3968051649"/>
       </p:ext>
     </p:extLst>
   </p:cSld>

</xml_diff>